<commit_message>
Add intro slide for each principle.
</commit_message>
<xml_diff>
--- a/SOLID.pptx
+++ b/SOLID.pptx
@@ -16,10 +16,13 @@
     <p:sldId id="269" r:id="rId10"/>
     <p:sldId id="270" r:id="rId11"/>
     <p:sldId id="261" r:id="rId12"/>
-    <p:sldId id="262" r:id="rId13"/>
-    <p:sldId id="263" r:id="rId14"/>
-    <p:sldId id="264" r:id="rId15"/>
-    <p:sldId id="259" r:id="rId16"/>
+    <p:sldId id="271" r:id="rId13"/>
+    <p:sldId id="272" r:id="rId14"/>
+    <p:sldId id="262" r:id="rId15"/>
+    <p:sldId id="263" r:id="rId16"/>
+    <p:sldId id="264" r:id="rId17"/>
+    <p:sldId id="273" r:id="rId18"/>
+    <p:sldId id="259" r:id="rId19"/>
   </p:sldIdLst>
   <p:sldSz cx="12192000" cy="6858000"/>
   <p:notesSz cx="6858000" cy="9144000"/>
@@ -118,6 +121,11 @@
       </a:defRPr>
     </a:lvl9pPr>
   </p:defaultTextStyle>
+  <p:extLst>
+    <p:ext uri="{EFAFB233-063F-42B5-8137-9DF3F51BA10A}">
+      <p15:sldGuideLst xmlns:p15="http://schemas.microsoft.com/office/powerpoint/2012/main"/>
+    </p:ext>
+  </p:extLst>
 </p:presentation>
 </file>
 
@@ -3541,10 +3549,10 @@
       </p:pic>
       <p:pic>
         <p:nvPicPr>
-          <p:cNvPr id="14" name="Paveikslėlis 13">
-            <a:extLst>
-              <a:ext uri="{FF2B5EF4-FFF2-40B4-BE49-F238E27FC236}">
-                <a16:creationId xmlns:a16="http://schemas.microsoft.com/office/drawing/2014/main" id="{97E6063C-2531-5D55-3C51-9CABE855CB67}"/>
+          <p:cNvPr id="5" name="Paveikslėlis 4">
+            <a:extLst>
+              <a:ext uri="{FF2B5EF4-FFF2-40B4-BE49-F238E27FC236}">
+                <a16:creationId xmlns:a16="http://schemas.microsoft.com/office/drawing/2014/main" id="{45F7E3F1-66E5-D00E-703E-334413E696D3}"/>
               </a:ext>
             </a:extLst>
           </p:cNvPr>
@@ -3561,8 +3569,8 @@
         </p:blipFill>
         <p:spPr>
           <a:xfrm>
-            <a:off x="6296299" y="1115385"/>
-            <a:ext cx="5781675" cy="4962525"/>
+            <a:off x="6069457" y="1054425"/>
+            <a:ext cx="6122543" cy="5154786"/>
           </a:xfrm>
           <a:prstGeom prst="rect">
             <a:avLst/>
@@ -3615,7 +3623,12 @@
             <p:ph type="title"/>
           </p:nvPr>
         </p:nvSpPr>
-        <p:spPr/>
+        <p:spPr>
+          <a:xfrm>
+            <a:off x="515983" y="175939"/>
+            <a:ext cx="10515600" cy="1325563"/>
+          </a:xfrm>
+        </p:spPr>
         <p:txBody>
           <a:bodyPr/>
           <a:lstStyle/>
@@ -3644,12 +3657,92 @@
             <p:ph idx="1"/>
           </p:nvPr>
         </p:nvSpPr>
-        <p:spPr/>
-        <p:txBody>
-          <a:bodyPr/>
-          <a:lstStyle/>
-          <a:p>
-            <a:endParaRPr lang="lt-LT"/>
+        <p:spPr>
+          <a:xfrm>
+            <a:off x="515983" y="1289753"/>
+            <a:ext cx="9829800" cy="939641"/>
+          </a:xfrm>
+        </p:spPr>
+        <p:txBody>
+          <a:bodyPr/>
+          <a:lstStyle/>
+          <a:p>
+            <a:pPr marL="0" indent="0">
+              <a:buNone/>
+            </a:pPr>
+            <a:r>
+              <a:rPr lang="en-US" u="sng" dirty="0"/>
+              <a:t>Software entities (classes, modules, functions, etc.) should be open for extension, but closed for modification.</a:t>
+            </a:r>
+          </a:p>
+          <a:p>
+            <a:endParaRPr lang="lt-LT" dirty="0"/>
+          </a:p>
+        </p:txBody>
+      </p:sp>
+      <p:pic>
+        <p:nvPicPr>
+          <p:cNvPr id="7" name="Paveikslėlis 6">
+            <a:extLst>
+              <a:ext uri="{FF2B5EF4-FFF2-40B4-BE49-F238E27FC236}">
+                <a16:creationId xmlns:a16="http://schemas.microsoft.com/office/drawing/2014/main" id="{6379E4BE-3DD1-91C3-9F02-B6045BFB75E1}"/>
+              </a:ext>
+            </a:extLst>
+          </p:cNvPr>
+          <p:cNvPicPr>
+            <a:picLocks noChangeAspect="1"/>
+          </p:cNvPicPr>
+          <p:nvPr/>
+        </p:nvPicPr>
+        <p:blipFill>
+          <a:blip r:embed="rId2"/>
+          <a:stretch>
+            <a:fillRect/>
+          </a:stretch>
+        </p:blipFill>
+        <p:spPr>
+          <a:xfrm>
+            <a:off x="2943497" y="2394857"/>
+            <a:ext cx="5426896" cy="3388543"/>
+          </a:xfrm>
+          <a:prstGeom prst="rect">
+            <a:avLst/>
+          </a:prstGeom>
+        </p:spPr>
+      </p:pic>
+      <p:sp>
+        <p:nvSpPr>
+          <p:cNvPr id="8" name="TextBox 7">
+            <a:extLst>
+              <a:ext uri="{FF2B5EF4-FFF2-40B4-BE49-F238E27FC236}">
+                <a16:creationId xmlns:a16="http://schemas.microsoft.com/office/drawing/2014/main" id="{29712E75-6716-2B5B-4082-1D0BC7D7E30A}"/>
+              </a:ext>
+            </a:extLst>
+          </p:cNvPr>
+          <p:cNvSpPr txBox="1"/>
+          <p:nvPr/>
+        </p:nvSpPr>
+        <p:spPr>
+          <a:xfrm>
+            <a:off x="2943497" y="5895703"/>
+            <a:ext cx="5491183" cy="369332"/>
+          </a:xfrm>
+          <a:prstGeom prst="rect">
+            <a:avLst/>
+          </a:prstGeom>
+          <a:noFill/>
+        </p:spPr>
+        <p:txBody>
+          <a:bodyPr wrap="none" rtlCol="0">
+            <a:spAutoFit/>
+          </a:bodyPr>
+          <a:lstStyle/>
+          <a:p>
+            <a:r>
+              <a:rPr lang="en-US" dirty="0"/>
+              <a:t>Lights can be attached without disassembling the engine</a:t>
+            </a:r>
+            <a:endParaRPr lang="lt-LT" dirty="0"/>
           </a:p>
         </p:txBody>
       </p:sp>
@@ -3705,12 +3798,8 @@
           <a:lstStyle/>
           <a:p>
             <a:r>
-              <a:rPr lang="en-US" dirty="0" err="1"/>
-              <a:t>Liskov</a:t>
-            </a:r>
-            <a:r>
               <a:rPr lang="en-US" dirty="0"/>
-              <a:t> substitution principle</a:t>
+              <a:t>Open-Closed principle</a:t>
             </a:r>
             <a:endParaRPr lang="lt-LT" dirty="0"/>
           </a:p>
@@ -3732,19 +3821,60 @@
             <p:ph idx="1"/>
           </p:nvPr>
         </p:nvSpPr>
-        <p:spPr/>
-        <p:txBody>
-          <a:bodyPr/>
-          <a:lstStyle/>
-          <a:p>
-            <a:endParaRPr lang="lt-LT"/>
-          </a:p>
-        </p:txBody>
-      </p:sp>
+        <p:spPr>
+          <a:xfrm>
+            <a:off x="838200" y="1898469"/>
+            <a:ext cx="4569823" cy="4278493"/>
+          </a:xfrm>
+        </p:spPr>
+        <p:txBody>
+          <a:bodyPr/>
+          <a:lstStyle/>
+          <a:p>
+            <a:endParaRPr lang="lt-LT" dirty="0"/>
+          </a:p>
+        </p:txBody>
+      </p:sp>
+      <p:pic>
+        <p:nvPicPr>
+          <p:cNvPr id="4" name="Paveikslėlis 3">
+            <a:extLst>
+              <a:ext uri="{FF2B5EF4-FFF2-40B4-BE49-F238E27FC236}">
+                <a16:creationId xmlns:a16="http://schemas.microsoft.com/office/drawing/2014/main" id="{07ED3570-EEC3-A725-4BBD-025204CC7608}"/>
+              </a:ext>
+            </a:extLst>
+          </p:cNvPr>
+          <p:cNvPicPr>
+            <a:picLocks noChangeAspect="1"/>
+          </p:cNvPicPr>
+          <p:nvPr/>
+        </p:nvPicPr>
+        <p:blipFill>
+          <a:blip r:embed="rId2">
+            <a:extLst>
+              <a:ext uri="{28A0092B-C50C-407E-A947-70E740481C1C}">
+                <a14:useLocalDpi xmlns:a14="http://schemas.microsoft.com/office/drawing/2010/main" val="0"/>
+              </a:ext>
+            </a:extLst>
+          </a:blip>
+          <a:stretch>
+            <a:fillRect/>
+          </a:stretch>
+        </p:blipFill>
+        <p:spPr>
+          <a:xfrm>
+            <a:off x="5738950" y="1278664"/>
+            <a:ext cx="6287588" cy="5403397"/>
+          </a:xfrm>
+          <a:prstGeom prst="rect">
+            <a:avLst/>
+          </a:prstGeom>
+        </p:spPr>
+      </p:pic>
     </p:spTree>
     <p:extLst>
       <p:ext uri="{BB962C8B-B14F-4D97-AF65-F5344CB8AC3E}">
-        <p14:creationId xmlns:p14="http://schemas.microsoft.com/office/powerpoint/2010/main" val="1219901685"/>
+        <p14:creationId xmlns:p14="http://schemas.microsoft.com/office/powerpoint/2010/main" val="862889286"/>
       </p:ext>
     </p:extLst>
   </p:cSld>
@@ -3794,7 +3924,7 @@
           <a:p>
             <a:r>
               <a:rPr lang="en-US" dirty="0"/>
-              <a:t>Interface Segregation principle</a:t>
+              <a:t>Open-Closed principle</a:t>
             </a:r>
             <a:endParaRPr lang="lt-LT" dirty="0"/>
           </a:p>
@@ -3816,19 +3946,24 @@
             <p:ph idx="1"/>
           </p:nvPr>
         </p:nvSpPr>
-        <p:spPr/>
-        <p:txBody>
-          <a:bodyPr/>
-          <a:lstStyle/>
-          <a:p>
-            <a:endParaRPr lang="lt-LT"/>
+        <p:spPr>
+          <a:xfrm>
+            <a:off x="838200" y="1898469"/>
+            <a:ext cx="4569823" cy="4278493"/>
+          </a:xfrm>
+        </p:spPr>
+        <p:txBody>
+          <a:bodyPr/>
+          <a:lstStyle/>
+          <a:p>
+            <a:endParaRPr lang="lt-LT" dirty="0"/>
           </a:p>
         </p:txBody>
       </p:sp>
     </p:spTree>
     <p:extLst>
       <p:ext uri="{BB962C8B-B14F-4D97-AF65-F5344CB8AC3E}">
-        <p14:creationId xmlns:p14="http://schemas.microsoft.com/office/powerpoint/2010/main" val="2006682548"/>
+        <p14:creationId xmlns:p14="http://schemas.microsoft.com/office/powerpoint/2010/main" val="3052208621"/>
       </p:ext>
     </p:extLst>
   </p:cSld>
@@ -3871,7 +4006,378 @@
             <p:ph type="title"/>
           </p:nvPr>
         </p:nvSpPr>
-        <p:spPr/>
+        <p:spPr>
+          <a:xfrm>
+            <a:off x="262222" y="326522"/>
+            <a:ext cx="6460796" cy="1325563"/>
+          </a:xfrm>
+        </p:spPr>
+        <p:txBody>
+          <a:bodyPr/>
+          <a:lstStyle/>
+          <a:p>
+            <a:r>
+              <a:rPr lang="en-US" dirty="0" err="1"/>
+              <a:t>Liskov</a:t>
+            </a:r>
+            <a:r>
+              <a:rPr lang="en-US" dirty="0"/>
+              <a:t> substitution principle</a:t>
+            </a:r>
+            <a:endParaRPr lang="lt-LT" dirty="0"/>
+          </a:p>
+        </p:txBody>
+      </p:sp>
+      <p:sp>
+        <p:nvSpPr>
+          <p:cNvPr id="3" name="Turinio vietos rezervavimo ženklas 2">
+            <a:extLst>
+              <a:ext uri="{FF2B5EF4-FFF2-40B4-BE49-F238E27FC236}">
+                <a16:creationId xmlns:a16="http://schemas.microsoft.com/office/drawing/2014/main" id="{7550D0C1-729E-A6DF-92AB-3579773EBB29}"/>
+              </a:ext>
+            </a:extLst>
+          </p:cNvPr>
+          <p:cNvSpPr>
+            <a:spLocks noGrp="1"/>
+          </p:cNvSpPr>
+          <p:nvPr>
+            <p:ph idx="1"/>
+          </p:nvPr>
+        </p:nvSpPr>
+        <p:spPr>
+          <a:xfrm>
+            <a:off x="6460482" y="5725540"/>
+            <a:ext cx="5580016" cy="612186"/>
+          </a:xfrm>
+        </p:spPr>
+        <p:txBody>
+          <a:bodyPr>
+            <a:normAutofit fontScale="55000" lnSpcReduction="20000"/>
+          </a:bodyPr>
+          <a:lstStyle/>
+          <a:p>
+            <a:pPr marL="0" indent="0" algn="ctr">
+              <a:buNone/>
+            </a:pPr>
+            <a:r>
+              <a:rPr lang="en-US" dirty="0"/>
+              <a:t>It looks like a duck, quacks like a duck, but it needs batteries!</a:t>
+            </a:r>
+          </a:p>
+          <a:p>
+            <a:pPr marL="0" indent="0" algn="ctr">
+              <a:buNone/>
+            </a:pPr>
+            <a:r>
+              <a:rPr lang="en-US" dirty="0"/>
+              <a:t>You probably have the wrong abstraction.</a:t>
+            </a:r>
+            <a:endParaRPr lang="lt-LT" dirty="0"/>
+          </a:p>
+        </p:txBody>
+      </p:sp>
+      <p:pic>
+        <p:nvPicPr>
+          <p:cNvPr id="5" name="Paveikslėlis 4">
+            <a:extLst>
+              <a:ext uri="{FF2B5EF4-FFF2-40B4-BE49-F238E27FC236}">
+                <a16:creationId xmlns:a16="http://schemas.microsoft.com/office/drawing/2014/main" id="{9987C2B4-3577-D6C2-C25E-D3DD85958638}"/>
+              </a:ext>
+            </a:extLst>
+          </p:cNvPr>
+          <p:cNvPicPr>
+            <a:picLocks noChangeAspect="1"/>
+          </p:cNvPicPr>
+          <p:nvPr/>
+        </p:nvPicPr>
+        <p:blipFill>
+          <a:blip r:embed="rId2"/>
+          <a:stretch>
+            <a:fillRect/>
+          </a:stretch>
+        </p:blipFill>
+        <p:spPr>
+          <a:xfrm>
+            <a:off x="6942046" y="372295"/>
+            <a:ext cx="4924178" cy="5167524"/>
+          </a:xfrm>
+          <a:prstGeom prst="rect">
+            <a:avLst/>
+          </a:prstGeom>
+        </p:spPr>
+      </p:pic>
+      <p:sp>
+        <p:nvSpPr>
+          <p:cNvPr id="6" name="TextBox 5">
+            <a:extLst>
+              <a:ext uri="{FF2B5EF4-FFF2-40B4-BE49-F238E27FC236}">
+                <a16:creationId xmlns:a16="http://schemas.microsoft.com/office/drawing/2014/main" id="{0F5F5465-DE06-7A05-43D6-D1CB0A9BB568}"/>
+              </a:ext>
+            </a:extLst>
+          </p:cNvPr>
+          <p:cNvSpPr txBox="1"/>
+          <p:nvPr/>
+        </p:nvSpPr>
+        <p:spPr>
+          <a:xfrm>
+            <a:off x="595741" y="2143899"/>
+            <a:ext cx="6127277" cy="1261884"/>
+          </a:xfrm>
+          <a:prstGeom prst="rect">
+            <a:avLst/>
+          </a:prstGeom>
+          <a:noFill/>
+        </p:spPr>
+        <p:txBody>
+          <a:bodyPr wrap="square" rtlCol="0">
+            <a:spAutoFit/>
+          </a:bodyPr>
+          <a:lstStyle/>
+          <a:p>
+            <a:r>
+              <a:rPr lang="en-US" sz="2000" u="sng" dirty="0"/>
+              <a:t>Objects of a superclass shall be replaceable with objects of its subclasses without breaking the application</a:t>
+            </a:r>
+            <a:r>
+              <a:rPr lang="en-US" sz="2000" dirty="0"/>
+              <a:t>.</a:t>
+            </a:r>
+          </a:p>
+          <a:p>
+            <a:br>
+              <a:rPr lang="en-US" u="sng" dirty="0"/>
+            </a:br>
+            <a:r>
+              <a:rPr lang="en-US" dirty="0"/>
+              <a:t>TLDR; </a:t>
+            </a:r>
+            <a:r>
+              <a:rPr lang="en-US" i="1" dirty="0"/>
+              <a:t>Use derived classes without knowing it.</a:t>
+            </a:r>
+            <a:endParaRPr lang="lt-LT" dirty="0"/>
+          </a:p>
+        </p:txBody>
+      </p:sp>
+    </p:spTree>
+    <p:extLst>
+      <p:ext uri="{BB962C8B-B14F-4D97-AF65-F5344CB8AC3E}">
+        <p14:creationId xmlns:p14="http://schemas.microsoft.com/office/powerpoint/2010/main" val="1219901685"/>
+      </p:ext>
+    </p:extLst>
+  </p:cSld>
+  <p:clrMapOvr>
+    <a:masterClrMapping/>
+  </p:clrMapOvr>
+</p:sld>
+</file>
+
+<file path=ppt/slides/slide15.xml><?xml version="1.0" encoding="utf-8"?>
+<p:sld xmlns:a="http://schemas.openxmlformats.org/drawingml/2006/main" xmlns:r="http://schemas.openxmlformats.org/officeDocument/2006/relationships" xmlns:p="http://schemas.openxmlformats.org/presentationml/2006/main">
+  <p:cSld>
+    <p:spTree>
+      <p:nvGrpSpPr>
+        <p:cNvPr id="1" name=""/>
+        <p:cNvGrpSpPr/>
+        <p:nvPr/>
+      </p:nvGrpSpPr>
+      <p:grpSpPr>
+        <a:xfrm>
+          <a:off x="0" y="0"/>
+          <a:ext cx="0" cy="0"/>
+          <a:chOff x="0" y="0"/>
+          <a:chExt cx="0" cy="0"/>
+        </a:xfrm>
+      </p:grpSpPr>
+      <p:sp>
+        <p:nvSpPr>
+          <p:cNvPr id="2" name="Pavadinimas 1">
+            <a:extLst>
+              <a:ext uri="{FF2B5EF4-FFF2-40B4-BE49-F238E27FC236}">
+                <a16:creationId xmlns:a16="http://schemas.microsoft.com/office/drawing/2014/main" id="{184075CD-AF81-0D83-AF05-6D10D6319443}"/>
+              </a:ext>
+            </a:extLst>
+          </p:cNvPr>
+          <p:cNvSpPr>
+            <a:spLocks noGrp="1"/>
+          </p:cNvSpPr>
+          <p:nvPr>
+            <p:ph type="title"/>
+          </p:nvPr>
+        </p:nvSpPr>
+        <p:spPr>
+          <a:xfrm>
+            <a:off x="280852" y="149724"/>
+            <a:ext cx="10515600" cy="1325563"/>
+          </a:xfrm>
+        </p:spPr>
+        <p:txBody>
+          <a:bodyPr/>
+          <a:lstStyle/>
+          <a:p>
+            <a:r>
+              <a:rPr lang="en-US" dirty="0"/>
+              <a:t>Interface Segregation principle</a:t>
+            </a:r>
+            <a:endParaRPr lang="lt-LT" dirty="0"/>
+          </a:p>
+        </p:txBody>
+      </p:sp>
+      <p:sp>
+        <p:nvSpPr>
+          <p:cNvPr id="3" name="Turinio vietos rezervavimo ženklas 2">
+            <a:extLst>
+              <a:ext uri="{FF2B5EF4-FFF2-40B4-BE49-F238E27FC236}">
+                <a16:creationId xmlns:a16="http://schemas.microsoft.com/office/drawing/2014/main" id="{7550D0C1-729E-A6DF-92AB-3579773EBB29}"/>
+              </a:ext>
+            </a:extLst>
+          </p:cNvPr>
+          <p:cNvSpPr>
+            <a:spLocks noGrp="1"/>
+          </p:cNvSpPr>
+          <p:nvPr>
+            <p:ph idx="1"/>
+          </p:nvPr>
+        </p:nvSpPr>
+        <p:spPr>
+          <a:xfrm>
+            <a:off x="838199" y="3135085"/>
+            <a:ext cx="5519057" cy="3041877"/>
+          </a:xfrm>
+        </p:spPr>
+        <p:txBody>
+          <a:bodyPr/>
+          <a:lstStyle/>
+          <a:p>
+            <a:pPr marL="0" indent="0">
+              <a:buNone/>
+            </a:pPr>
+            <a:r>
+              <a:rPr lang="en-US" u="sng" dirty="0"/>
+              <a:t>Fine grained client-specific interfaces</a:t>
+            </a:r>
+            <a:endParaRPr lang="lt-LT" u="sng" dirty="0"/>
+          </a:p>
+        </p:txBody>
+      </p:sp>
+      <p:pic>
+        <p:nvPicPr>
+          <p:cNvPr id="5" name="Paveikslėlis 4">
+            <a:extLst>
+              <a:ext uri="{FF2B5EF4-FFF2-40B4-BE49-F238E27FC236}">
+                <a16:creationId xmlns:a16="http://schemas.microsoft.com/office/drawing/2014/main" id="{21030A4F-DF7F-453B-7F78-C9CEF4B2E1AF}"/>
+              </a:ext>
+            </a:extLst>
+          </p:cNvPr>
+          <p:cNvPicPr>
+            <a:picLocks noChangeAspect="1"/>
+          </p:cNvPicPr>
+          <p:nvPr/>
+        </p:nvPicPr>
+        <p:blipFill>
+          <a:blip r:embed="rId2"/>
+          <a:stretch>
+            <a:fillRect/>
+          </a:stretch>
+        </p:blipFill>
+        <p:spPr>
+          <a:xfrm>
+            <a:off x="7228114" y="1145189"/>
+            <a:ext cx="4604657" cy="4567622"/>
+          </a:xfrm>
+          <a:prstGeom prst="rect">
+            <a:avLst/>
+          </a:prstGeom>
+        </p:spPr>
+      </p:pic>
+      <p:sp>
+        <p:nvSpPr>
+          <p:cNvPr id="6" name="TextBox 5">
+            <a:extLst>
+              <a:ext uri="{FF2B5EF4-FFF2-40B4-BE49-F238E27FC236}">
+                <a16:creationId xmlns:a16="http://schemas.microsoft.com/office/drawing/2014/main" id="{A246F5E6-3581-FE21-C5E6-2C42B3886473}"/>
+              </a:ext>
+            </a:extLst>
+          </p:cNvPr>
+          <p:cNvSpPr txBox="1"/>
+          <p:nvPr/>
+        </p:nvSpPr>
+        <p:spPr>
+          <a:xfrm>
+            <a:off x="7522132" y="5992297"/>
+            <a:ext cx="4669868" cy="369332"/>
+          </a:xfrm>
+          <a:prstGeom prst="rect">
+            <a:avLst/>
+          </a:prstGeom>
+          <a:noFill/>
+        </p:spPr>
+        <p:txBody>
+          <a:bodyPr wrap="none" rtlCol="0">
+            <a:spAutoFit/>
+          </a:bodyPr>
+          <a:lstStyle/>
+          <a:p>
+            <a:r>
+              <a:rPr lang="en-US" dirty="0"/>
+              <a:t>There is no combined power &amp; water connector</a:t>
+            </a:r>
+            <a:endParaRPr lang="lt-LT" dirty="0"/>
+          </a:p>
+        </p:txBody>
+      </p:sp>
+    </p:spTree>
+    <p:extLst>
+      <p:ext uri="{BB962C8B-B14F-4D97-AF65-F5344CB8AC3E}">
+        <p14:creationId xmlns:p14="http://schemas.microsoft.com/office/powerpoint/2010/main" val="2006682548"/>
+      </p:ext>
+    </p:extLst>
+  </p:cSld>
+  <p:clrMapOvr>
+    <a:masterClrMapping/>
+  </p:clrMapOvr>
+</p:sld>
+</file>
+
+<file path=ppt/slides/slide16.xml><?xml version="1.0" encoding="utf-8"?>
+<p:sld xmlns:a="http://schemas.openxmlformats.org/drawingml/2006/main" xmlns:r="http://schemas.openxmlformats.org/officeDocument/2006/relationships" xmlns:p="http://schemas.openxmlformats.org/presentationml/2006/main">
+  <p:cSld>
+    <p:spTree>
+      <p:nvGrpSpPr>
+        <p:cNvPr id="1" name=""/>
+        <p:cNvGrpSpPr/>
+        <p:nvPr/>
+      </p:nvGrpSpPr>
+      <p:grpSpPr>
+        <a:xfrm>
+          <a:off x="0" y="0"/>
+          <a:ext cx="0" cy="0"/>
+          <a:chOff x="0" y="0"/>
+          <a:chExt cx="0" cy="0"/>
+        </a:xfrm>
+      </p:grpSpPr>
+      <p:sp>
+        <p:nvSpPr>
+          <p:cNvPr id="2" name="Pavadinimas 1">
+            <a:extLst>
+              <a:ext uri="{FF2B5EF4-FFF2-40B4-BE49-F238E27FC236}">
+                <a16:creationId xmlns:a16="http://schemas.microsoft.com/office/drawing/2014/main" id="{184075CD-AF81-0D83-AF05-6D10D6319443}"/>
+              </a:ext>
+            </a:extLst>
+          </p:cNvPr>
+          <p:cNvSpPr>
+            <a:spLocks noGrp="1"/>
+          </p:cNvSpPr>
+          <p:nvPr>
+            <p:ph type="title"/>
+          </p:nvPr>
+        </p:nvSpPr>
+        <p:spPr>
+          <a:xfrm>
+            <a:off x="286839" y="167957"/>
+            <a:ext cx="10515600" cy="1325563"/>
+          </a:xfrm>
+        </p:spPr>
         <p:txBody>
           <a:bodyPr/>
           <a:lstStyle/>
@@ -3900,12 +4406,90 @@
             <p:ph idx="1"/>
           </p:nvPr>
         </p:nvSpPr>
-        <p:spPr/>
-        <p:txBody>
-          <a:bodyPr/>
-          <a:lstStyle/>
-          <a:p>
-            <a:endParaRPr lang="lt-LT"/>
+        <p:spPr>
+          <a:xfrm>
+            <a:off x="519590" y="2664823"/>
+            <a:ext cx="4822371" cy="3520049"/>
+          </a:xfrm>
+        </p:spPr>
+        <p:txBody>
+          <a:bodyPr/>
+          <a:lstStyle/>
+          <a:p>
+            <a:pPr marL="0" indent="0">
+              <a:buNone/>
+            </a:pPr>
+            <a:r>
+              <a:rPr lang="en-US" u="sng" dirty="0"/>
+              <a:t>Depend on abstractions, not concrete implementations.</a:t>
+            </a:r>
+            <a:endParaRPr lang="lt-LT" u="sng" dirty="0"/>
+          </a:p>
+        </p:txBody>
+      </p:sp>
+      <p:pic>
+        <p:nvPicPr>
+          <p:cNvPr id="5" name="Paveikslėlis 4">
+            <a:extLst>
+              <a:ext uri="{FF2B5EF4-FFF2-40B4-BE49-F238E27FC236}">
+                <a16:creationId xmlns:a16="http://schemas.microsoft.com/office/drawing/2014/main" id="{58A4B17D-A496-E6D6-59C3-E05EB63321EB}"/>
+              </a:ext>
+            </a:extLst>
+          </p:cNvPr>
+          <p:cNvPicPr>
+            <a:picLocks noChangeAspect="1"/>
+          </p:cNvPicPr>
+          <p:nvPr/>
+        </p:nvPicPr>
+        <p:blipFill>
+          <a:blip r:embed="rId2"/>
+          <a:stretch>
+            <a:fillRect/>
+          </a:stretch>
+        </p:blipFill>
+        <p:spPr>
+          <a:xfrm>
+            <a:off x="5544639" y="1687467"/>
+            <a:ext cx="6598580" cy="4118791"/>
+          </a:xfrm>
+          <a:prstGeom prst="rect">
+            <a:avLst/>
+          </a:prstGeom>
+        </p:spPr>
+      </p:pic>
+      <p:sp>
+        <p:nvSpPr>
+          <p:cNvPr id="6" name="TextBox 5">
+            <a:extLst>
+              <a:ext uri="{FF2B5EF4-FFF2-40B4-BE49-F238E27FC236}">
+                <a16:creationId xmlns:a16="http://schemas.microsoft.com/office/drawing/2014/main" id="{CC0444F3-6571-5819-6DF8-B64A37C5D011}"/>
+              </a:ext>
+            </a:extLst>
+          </p:cNvPr>
+          <p:cNvSpPr txBox="1"/>
+          <p:nvPr/>
+        </p:nvSpPr>
+        <p:spPr>
+          <a:xfrm>
+            <a:off x="6783977" y="6000206"/>
+            <a:ext cx="4794711" cy="369332"/>
+          </a:xfrm>
+          <a:prstGeom prst="rect">
+            <a:avLst/>
+          </a:prstGeom>
+          <a:noFill/>
+        </p:spPr>
+        <p:txBody>
+          <a:bodyPr wrap="none" rtlCol="0">
+            <a:spAutoFit/>
+          </a:bodyPr>
+          <a:lstStyle/>
+          <a:p>
+            <a:r>
+              <a:rPr lang="en-US" dirty="0"/>
+              <a:t>Excavator design doesn’t depend on attachments</a:t>
+            </a:r>
+            <a:endParaRPr lang="lt-LT" dirty="0"/>
           </a:p>
         </p:txBody>
       </p:sp>
@@ -3922,7 +4506,103 @@
 </p:sld>
 </file>
 
-<file path=ppt/slides/slide15.xml><?xml version="1.0" encoding="utf-8"?>
+<file path=ppt/slides/slide17.xml><?xml version="1.0" encoding="utf-8"?>
+<p:sld xmlns:a="http://schemas.openxmlformats.org/drawingml/2006/main" xmlns:r="http://schemas.openxmlformats.org/officeDocument/2006/relationships" xmlns:p="http://schemas.openxmlformats.org/presentationml/2006/main">
+  <p:cSld>
+    <p:spTree>
+      <p:nvGrpSpPr>
+        <p:cNvPr id="1" name=""/>
+        <p:cNvGrpSpPr/>
+        <p:nvPr/>
+      </p:nvGrpSpPr>
+      <p:grpSpPr>
+        <a:xfrm>
+          <a:off x="0" y="0"/>
+          <a:ext cx="0" cy="0"/>
+          <a:chOff x="0" y="0"/>
+          <a:chExt cx="0" cy="0"/>
+        </a:xfrm>
+      </p:grpSpPr>
+      <p:sp>
+        <p:nvSpPr>
+          <p:cNvPr id="2" name="Pavadinimas 1">
+            <a:extLst>
+              <a:ext uri="{FF2B5EF4-FFF2-40B4-BE49-F238E27FC236}">
+                <a16:creationId xmlns:a16="http://schemas.microsoft.com/office/drawing/2014/main" id="{184075CD-AF81-0D83-AF05-6D10D6319443}"/>
+              </a:ext>
+            </a:extLst>
+          </p:cNvPr>
+          <p:cNvSpPr>
+            <a:spLocks noGrp="1"/>
+          </p:cNvSpPr>
+          <p:nvPr>
+            <p:ph type="title"/>
+          </p:nvPr>
+        </p:nvSpPr>
+        <p:spPr/>
+        <p:txBody>
+          <a:bodyPr/>
+          <a:lstStyle/>
+          <a:p>
+            <a:pPr algn="ctr"/>
+            <a:r>
+              <a:rPr lang="en-US" dirty="0"/>
+              <a:t>Workshop time!</a:t>
+            </a:r>
+            <a:endParaRPr lang="lt-LT" dirty="0"/>
+          </a:p>
+        </p:txBody>
+      </p:sp>
+      <p:pic>
+        <p:nvPicPr>
+          <p:cNvPr id="5" name="Paveikslėlis 4">
+            <a:extLst>
+              <a:ext uri="{FF2B5EF4-FFF2-40B4-BE49-F238E27FC236}">
+                <a16:creationId xmlns:a16="http://schemas.microsoft.com/office/drawing/2014/main" id="{CBFBD389-2B23-8630-8064-84A7A2193B82}"/>
+              </a:ext>
+            </a:extLst>
+          </p:cNvPr>
+          <p:cNvPicPr>
+            <a:picLocks noChangeAspect="1"/>
+          </p:cNvPicPr>
+          <p:nvPr/>
+        </p:nvPicPr>
+        <p:blipFill>
+          <a:blip r:embed="rId2">
+            <a:extLst>
+              <a:ext uri="{28A0092B-C50C-407E-A947-70E740481C1C}">
+                <a14:useLocalDpi xmlns:a14="http://schemas.microsoft.com/office/drawing/2010/main" val="0"/>
+              </a:ext>
+            </a:extLst>
+          </a:blip>
+          <a:stretch>
+            <a:fillRect/>
+          </a:stretch>
+        </p:blipFill>
+        <p:spPr>
+          <a:xfrm>
+            <a:off x="1694362" y="1604791"/>
+            <a:ext cx="8803276" cy="4736545"/>
+          </a:xfrm>
+          <a:prstGeom prst="rect">
+            <a:avLst/>
+          </a:prstGeom>
+        </p:spPr>
+      </p:pic>
+    </p:spTree>
+    <p:extLst>
+      <p:ext uri="{BB962C8B-B14F-4D97-AF65-F5344CB8AC3E}">
+        <p14:creationId xmlns:p14="http://schemas.microsoft.com/office/powerpoint/2010/main" val="2211100357"/>
+      </p:ext>
+    </p:extLst>
+  </p:cSld>
+  <p:clrMapOvr>
+    <a:masterClrMapping/>
+  </p:clrMapOvr>
+</p:sld>
+</file>
+
+<file path=ppt/slides/slide18.xml><?xml version="1.0" encoding="utf-8"?>
 <p:sld xmlns:a="http://schemas.openxmlformats.org/drawingml/2006/main" xmlns:r="http://schemas.openxmlformats.org/officeDocument/2006/relationships" xmlns:p="http://schemas.openxmlformats.org/presentationml/2006/main">
   <p:cSld>
     <p:spTree>
@@ -4175,7 +4855,7 @@
           <a:p>
             <a:r>
               <a:rPr lang="en-US" dirty="0"/>
-              <a:t>What is SOLID?</a:t>
+              <a:t>What does SOLID stand for?</a:t>
             </a:r>
             <a:endParaRPr lang="lt-LT" dirty="0"/>
           </a:p>
@@ -4333,14 +5013,19 @@
             <p:ph type="title"/>
           </p:nvPr>
         </p:nvSpPr>
-        <p:spPr/>
+        <p:spPr>
+          <a:xfrm>
+            <a:off x="367937" y="268287"/>
+            <a:ext cx="10515600" cy="1325563"/>
+          </a:xfrm>
+        </p:spPr>
         <p:txBody>
           <a:bodyPr/>
           <a:lstStyle/>
           <a:p>
             <a:r>
               <a:rPr lang="en-US" dirty="0"/>
-              <a:t>Why is SOLID important?</a:t>
+              <a:t>Why SOLID is important?</a:t>
             </a:r>
             <a:endParaRPr lang="lt-LT" dirty="0"/>
           </a:p>
@@ -4362,7 +5047,12 @@
             <p:ph idx="1"/>
           </p:nvPr>
         </p:nvSpPr>
-        <p:spPr/>
+        <p:spPr>
+          <a:xfrm>
+            <a:off x="124097" y="2309812"/>
+            <a:ext cx="10515600" cy="4351338"/>
+          </a:xfrm>
+        </p:spPr>
         <p:txBody>
           <a:bodyPr/>
           <a:lstStyle/>
@@ -4375,7 +5065,7 @@
           <a:p>
             <a:r>
               <a:rPr lang="en-US" dirty="0"/>
-              <a:t>Avoid common pitfalls of OOP</a:t>
+              <a:t>Avoid complexity headache</a:t>
             </a:r>
           </a:p>
           <a:p>
@@ -4397,19 +5087,6 @@
               <a:rPr lang="en-US" dirty="0"/>
               <a:t>Better flexibility</a:t>
             </a:r>
-            <a:r>
-              <a:rPr lang="lt-LT" dirty="0"/>
-              <a:t>, </a:t>
-            </a:r>
-            <a:r>
-              <a:rPr lang="en-US" dirty="0"/>
-              <a:t>reduced </a:t>
-            </a:r>
-            <a:r>
-              <a:rPr lang="lt-LT" dirty="0" err="1"/>
-              <a:t>complexity</a:t>
-            </a:r>
-            <a:endParaRPr lang="en-US" dirty="0"/>
           </a:p>
           <a:p>
             <a:pPr lvl="1"/>
@@ -4426,12 +5103,16 @@
           </a:p>
           <a:p>
             <a:r>
+              <a:rPr lang="en-US" dirty="0"/>
+              <a:t>It is</a:t>
+            </a:r>
+            <a:r>
               <a:rPr lang="en-US" i="1" dirty="0"/>
-              <a:t>Industry-standard</a:t>
+              <a:t> industry-standard</a:t>
             </a:r>
             <a:r>
               <a:rPr lang="en-US" dirty="0"/>
-              <a:t> and very common question in interviews</a:t>
+              <a:t> and common question in interviews</a:t>
             </a:r>
           </a:p>
           <a:p>
@@ -4442,6 +5123,42 @@
           </a:p>
         </p:txBody>
       </p:sp>
+      <p:pic>
+        <p:nvPicPr>
+          <p:cNvPr id="7" name="Paveikslėlis 6">
+            <a:extLst>
+              <a:ext uri="{FF2B5EF4-FFF2-40B4-BE49-F238E27FC236}">
+                <a16:creationId xmlns:a16="http://schemas.microsoft.com/office/drawing/2014/main" id="{F90BACEA-0652-D885-BD10-4585A4E6C66E}"/>
+              </a:ext>
+            </a:extLst>
+          </p:cNvPr>
+          <p:cNvPicPr>
+            <a:picLocks noChangeAspect="1"/>
+          </p:cNvPicPr>
+          <p:nvPr/>
+        </p:nvPicPr>
+        <p:blipFill>
+          <a:blip r:embed="rId2">
+            <a:extLst>
+              <a:ext uri="{28A0092B-C50C-407E-A947-70E740481C1C}">
+                <a14:useLocalDpi xmlns:a14="http://schemas.microsoft.com/office/drawing/2010/main" val="0"/>
+              </a:ext>
+            </a:extLst>
+          </a:blip>
+          <a:stretch>
+            <a:fillRect/>
+          </a:stretch>
+        </p:blipFill>
+        <p:spPr>
+          <a:xfrm>
+            <a:off x="7193280" y="158425"/>
+            <a:ext cx="4770120" cy="4509762"/>
+          </a:xfrm>
+          <a:prstGeom prst="rect">
+            <a:avLst/>
+          </a:prstGeom>
+        </p:spPr>
+      </p:pic>
     </p:spTree>
     <p:extLst>
       <p:ext uri="{BB962C8B-B14F-4D97-AF65-F5344CB8AC3E}">

</xml_diff>

<commit_message>
Add code snippets for Liskov principle.
</commit_message>
<xml_diff>
--- a/SOLID.pptx
+++ b/SOLID.pptx
@@ -18,11 +18,15 @@
     <p:sldId id="261" r:id="rId12"/>
     <p:sldId id="271" r:id="rId13"/>
     <p:sldId id="272" r:id="rId14"/>
-    <p:sldId id="262" r:id="rId15"/>
-    <p:sldId id="263" r:id="rId16"/>
-    <p:sldId id="264" r:id="rId17"/>
-    <p:sldId id="273" r:id="rId18"/>
-    <p:sldId id="259" r:id="rId19"/>
+    <p:sldId id="278" r:id="rId15"/>
+    <p:sldId id="262" r:id="rId16"/>
+    <p:sldId id="279" r:id="rId17"/>
+    <p:sldId id="280" r:id="rId18"/>
+    <p:sldId id="263" r:id="rId19"/>
+    <p:sldId id="264" r:id="rId20"/>
+    <p:sldId id="277" r:id="rId21"/>
+    <p:sldId id="273" r:id="rId22"/>
+    <p:sldId id="259" r:id="rId23"/>
   </p:sldIdLst>
   <p:sldSz cx="12192000" cy="6858000"/>
   <p:notesSz cx="6858000" cy="9144000"/>
@@ -276,7 +280,7 @@
           <a:p>
             <a:fld id="{D1804E57-1A25-4235-B8A4-769545695592}" type="datetimeFigureOut">
               <a:rPr lang="lt-LT" smtClean="0"/>
-              <a:t>2022-12-03</a:t>
+              <a:t>2022-12-04</a:t>
             </a:fld>
             <a:endParaRPr lang="lt-LT"/>
           </a:p>
@@ -474,7 +478,7 @@
           <a:p>
             <a:fld id="{D1804E57-1A25-4235-B8A4-769545695592}" type="datetimeFigureOut">
               <a:rPr lang="lt-LT" smtClean="0"/>
-              <a:t>2022-12-03</a:t>
+              <a:t>2022-12-04</a:t>
             </a:fld>
             <a:endParaRPr lang="lt-LT"/>
           </a:p>
@@ -682,7 +686,7 @@
           <a:p>
             <a:fld id="{D1804E57-1A25-4235-B8A4-769545695592}" type="datetimeFigureOut">
               <a:rPr lang="lt-LT" smtClean="0"/>
-              <a:t>2022-12-03</a:t>
+              <a:t>2022-12-04</a:t>
             </a:fld>
             <a:endParaRPr lang="lt-LT"/>
           </a:p>
@@ -880,7 +884,7 @@
           <a:p>
             <a:fld id="{D1804E57-1A25-4235-B8A4-769545695592}" type="datetimeFigureOut">
               <a:rPr lang="lt-LT" smtClean="0"/>
-              <a:t>2022-12-03</a:t>
+              <a:t>2022-12-04</a:t>
             </a:fld>
             <a:endParaRPr lang="lt-LT"/>
           </a:p>
@@ -1155,7 +1159,7 @@
           <a:p>
             <a:fld id="{D1804E57-1A25-4235-B8A4-769545695592}" type="datetimeFigureOut">
               <a:rPr lang="lt-LT" smtClean="0"/>
-              <a:t>2022-12-03</a:t>
+              <a:t>2022-12-04</a:t>
             </a:fld>
             <a:endParaRPr lang="lt-LT"/>
           </a:p>
@@ -1420,7 +1424,7 @@
           <a:p>
             <a:fld id="{D1804E57-1A25-4235-B8A4-769545695592}" type="datetimeFigureOut">
               <a:rPr lang="lt-LT" smtClean="0"/>
-              <a:t>2022-12-03</a:t>
+              <a:t>2022-12-04</a:t>
             </a:fld>
             <a:endParaRPr lang="lt-LT"/>
           </a:p>
@@ -1832,7 +1836,7 @@
           <a:p>
             <a:fld id="{D1804E57-1A25-4235-B8A4-769545695592}" type="datetimeFigureOut">
               <a:rPr lang="lt-LT" smtClean="0"/>
-              <a:t>2022-12-03</a:t>
+              <a:t>2022-12-04</a:t>
             </a:fld>
             <a:endParaRPr lang="lt-LT"/>
           </a:p>
@@ -1973,7 +1977,7 @@
           <a:p>
             <a:fld id="{D1804E57-1A25-4235-B8A4-769545695592}" type="datetimeFigureOut">
               <a:rPr lang="lt-LT" smtClean="0"/>
-              <a:t>2022-12-03</a:t>
+              <a:t>2022-12-04</a:t>
             </a:fld>
             <a:endParaRPr lang="lt-LT"/>
           </a:p>
@@ -2086,7 +2090,7 @@
           <a:p>
             <a:fld id="{D1804E57-1A25-4235-B8A4-769545695592}" type="datetimeFigureOut">
               <a:rPr lang="lt-LT" smtClean="0"/>
-              <a:t>2022-12-03</a:t>
+              <a:t>2022-12-04</a:t>
             </a:fld>
             <a:endParaRPr lang="lt-LT"/>
           </a:p>
@@ -2397,7 +2401,7 @@
           <a:p>
             <a:fld id="{D1804E57-1A25-4235-B8A4-769545695592}" type="datetimeFigureOut">
               <a:rPr lang="lt-LT" smtClean="0"/>
-              <a:t>2022-12-03</a:t>
+              <a:t>2022-12-04</a:t>
             </a:fld>
             <a:endParaRPr lang="lt-LT"/>
           </a:p>
@@ -2685,7 +2689,7 @@
           <a:p>
             <a:fld id="{D1804E57-1A25-4235-B8A4-769545695592}" type="datetimeFigureOut">
               <a:rPr lang="lt-LT" smtClean="0"/>
-              <a:t>2022-12-03</a:t>
+              <a:t>2022-12-04</a:t>
             </a:fld>
             <a:endParaRPr lang="lt-LT"/>
           </a:p>
@@ -2926,7 +2930,7 @@
           <a:p>
             <a:fld id="{D1804E57-1A25-4235-B8A4-769545695592}" type="datetimeFigureOut">
               <a:rPr lang="lt-LT" smtClean="0"/>
-              <a:t>2022-12-03</a:t>
+              <a:t>2022-12-04</a:t>
             </a:fld>
             <a:endParaRPr lang="lt-LT"/>
           </a:p>
@@ -3792,7 +3796,12 @@
             <p:ph type="title"/>
           </p:nvPr>
         </p:nvSpPr>
-        <p:spPr/>
+        <p:spPr>
+          <a:xfrm>
+            <a:off x="481150" y="256068"/>
+            <a:ext cx="10515600" cy="1325563"/>
+          </a:xfrm>
+        </p:spPr>
         <p:txBody>
           <a:bodyPr/>
           <a:lstStyle/>
@@ -3823,13 +3832,60 @@
         </p:nvSpPr>
         <p:spPr>
           <a:xfrm>
-            <a:off x="838200" y="1898469"/>
-            <a:ext cx="4569823" cy="4278493"/>
+            <a:off x="486562" y="1988191"/>
+            <a:ext cx="4921462" cy="4188771"/>
           </a:xfrm>
         </p:spPr>
         <p:txBody>
           <a:bodyPr/>
           <a:lstStyle/>
+          <a:p>
+            <a:pPr fontAlgn="base">
+              <a:spcBef>
+                <a:spcPts val="0"/>
+              </a:spcBef>
+            </a:pPr>
+            <a:r>
+              <a:rPr lang="en-US" dirty="0"/>
+              <a:t>Less changes in existing code</a:t>
+            </a:r>
+          </a:p>
+          <a:p>
+            <a:pPr fontAlgn="base">
+              <a:spcBef>
+                <a:spcPts val="0"/>
+              </a:spcBef>
+            </a:pPr>
+            <a:r>
+              <a:rPr lang="en-US" dirty="0"/>
+              <a:t>Less chances of breaking anything with new functionality</a:t>
+            </a:r>
+          </a:p>
+          <a:p>
+            <a:pPr fontAlgn="base">
+              <a:spcBef>
+                <a:spcPts val="0"/>
+              </a:spcBef>
+            </a:pPr>
+            <a:r>
+              <a:rPr lang="en-US" dirty="0"/>
+              <a:t>Easier to find different functionality</a:t>
+            </a:r>
+          </a:p>
+          <a:p>
+            <a:pPr fontAlgn="base">
+              <a:spcBef>
+                <a:spcPts val="0"/>
+              </a:spcBef>
+              <a:spcAft>
+                <a:spcPts val="1600"/>
+              </a:spcAft>
+            </a:pPr>
+            <a:r>
+              <a:rPr lang="en-US" dirty="0"/>
+              <a:t>New changes has isolated complexity (no accumulated complexity)</a:t>
+            </a:r>
+          </a:p>
           <a:p>
             <a:endParaRPr lang="lt-LT" dirty="0"/>
           </a:p>
@@ -3917,7 +3973,12 @@
             <p:ph type="title"/>
           </p:nvPr>
         </p:nvSpPr>
-        <p:spPr/>
+        <p:spPr>
+          <a:xfrm>
+            <a:off x="396379" y="226037"/>
+            <a:ext cx="10515600" cy="1325563"/>
+          </a:xfrm>
+        </p:spPr>
         <p:txBody>
           <a:bodyPr/>
           <a:lstStyle/>
@@ -3948,18 +4009,326 @@
         </p:nvSpPr>
         <p:spPr>
           <a:xfrm>
-            <a:off x="838200" y="1898469"/>
-            <a:ext cx="4569823" cy="4278493"/>
+            <a:off x="396379" y="1551600"/>
+            <a:ext cx="5151539" cy="4278493"/>
           </a:xfrm>
         </p:spPr>
         <p:txBody>
           <a:bodyPr/>
           <a:lstStyle/>
           <a:p>
+            <a:pPr marL="0" indent="0">
+              <a:buNone/>
+            </a:pPr>
+            <a:r>
+              <a:rPr lang="en-US" dirty="0"/>
+              <a:t>How to add functionality without changing existing code?</a:t>
+            </a:r>
+          </a:p>
+          <a:p>
+            <a:pPr lvl="1"/>
+            <a:r>
+              <a:rPr lang="en-US" dirty="0"/>
+              <a:t>Accepting functions as parameters</a:t>
+            </a:r>
+          </a:p>
+          <a:p>
+            <a:pPr lvl="1"/>
+            <a:r>
+              <a:rPr lang="en-US" dirty="0"/>
+              <a:t>Using Extension Methods</a:t>
+            </a:r>
+          </a:p>
+          <a:p>
+            <a:pPr lvl="1"/>
+            <a:r>
+              <a:rPr lang="en-US" dirty="0"/>
+              <a:t>Using Inheritance</a:t>
+            </a:r>
+          </a:p>
+          <a:p>
+            <a:pPr lvl="1"/>
+            <a:r>
+              <a:rPr lang="en-US" dirty="0"/>
+              <a:t>Using Generics</a:t>
+            </a:r>
+          </a:p>
+          <a:p>
+            <a:pPr lvl="1"/>
+            <a:r>
+              <a:rPr lang="en-US" dirty="0"/>
+              <a:t>Using Composition</a:t>
+            </a:r>
+          </a:p>
+          <a:p>
             <a:endParaRPr lang="lt-LT" dirty="0"/>
           </a:p>
         </p:txBody>
       </p:sp>
+      <p:pic>
+        <p:nvPicPr>
+          <p:cNvPr id="5" name="Paveikslėlis 4">
+            <a:extLst>
+              <a:ext uri="{FF2B5EF4-FFF2-40B4-BE49-F238E27FC236}">
+                <a16:creationId xmlns:a16="http://schemas.microsoft.com/office/drawing/2014/main" id="{B97CE4FC-188C-7C34-5617-0B5841E5CDD3}"/>
+              </a:ext>
+            </a:extLst>
+          </p:cNvPr>
+          <p:cNvPicPr>
+            <a:picLocks noChangeAspect="1"/>
+          </p:cNvPicPr>
+          <p:nvPr/>
+        </p:nvPicPr>
+        <p:blipFill>
+          <a:blip r:embed="rId2"/>
+          <a:stretch>
+            <a:fillRect/>
+          </a:stretch>
+        </p:blipFill>
+        <p:spPr>
+          <a:xfrm>
+            <a:off x="6441341" y="5782894"/>
+            <a:ext cx="4857750" cy="942975"/>
+          </a:xfrm>
+          <a:prstGeom prst="rect">
+            <a:avLst/>
+          </a:prstGeom>
+        </p:spPr>
+      </p:pic>
+      <p:pic>
+        <p:nvPicPr>
+          <p:cNvPr id="9" name="Paveikslėlis 8">
+            <a:extLst>
+              <a:ext uri="{FF2B5EF4-FFF2-40B4-BE49-F238E27FC236}">
+                <a16:creationId xmlns:a16="http://schemas.microsoft.com/office/drawing/2014/main" id="{F09B86D5-BAC9-F0DE-67A0-C7E2D6C80D8C}"/>
+              </a:ext>
+            </a:extLst>
+          </p:cNvPr>
+          <p:cNvPicPr>
+            <a:picLocks noChangeAspect="1"/>
+          </p:cNvPicPr>
+          <p:nvPr/>
+        </p:nvPicPr>
+        <p:blipFill>
+          <a:blip r:embed="rId3"/>
+          <a:stretch>
+            <a:fillRect/>
+          </a:stretch>
+        </p:blipFill>
+        <p:spPr>
+          <a:xfrm>
+            <a:off x="6536121" y="2159410"/>
+            <a:ext cx="4552950" cy="3314700"/>
+          </a:xfrm>
+          <a:prstGeom prst="rect">
+            <a:avLst/>
+          </a:prstGeom>
+        </p:spPr>
+      </p:pic>
+      <p:sp>
+        <p:nvSpPr>
+          <p:cNvPr id="14" name="TextBox 13">
+            <a:extLst>
+              <a:ext uri="{FF2B5EF4-FFF2-40B4-BE49-F238E27FC236}">
+                <a16:creationId xmlns:a16="http://schemas.microsoft.com/office/drawing/2014/main" id="{E33937BE-E8FC-5B0D-A48C-83AA1F20D2AE}"/>
+              </a:ext>
+            </a:extLst>
+          </p:cNvPr>
+          <p:cNvSpPr txBox="1"/>
+          <p:nvPr/>
+        </p:nvSpPr>
+        <p:spPr>
+          <a:xfrm>
+            <a:off x="2670462" y="4567851"/>
+            <a:ext cx="301686" cy="369332"/>
+          </a:xfrm>
+          <a:prstGeom prst="rect">
+            <a:avLst/>
+          </a:prstGeom>
+          <a:noFill/>
+        </p:spPr>
+        <p:txBody>
+          <a:bodyPr wrap="none" rtlCol="0">
+            <a:spAutoFit/>
+          </a:bodyPr>
+          <a:lstStyle/>
+          <a:p>
+            <a:r>
+              <a:rPr lang="en-US" dirty="0"/>
+              <a:t>1</a:t>
+            </a:r>
+            <a:endParaRPr lang="lt-LT" dirty="0"/>
+          </a:p>
+        </p:txBody>
+      </p:sp>
+      <p:sp>
+        <p:nvSpPr>
+          <p:cNvPr id="15" name="TextBox 14">
+            <a:extLst>
+              <a:ext uri="{FF2B5EF4-FFF2-40B4-BE49-F238E27FC236}">
+                <a16:creationId xmlns:a16="http://schemas.microsoft.com/office/drawing/2014/main" id="{A5F8EC8A-B8D4-6A3A-DDC2-FC4D38E9DC42}"/>
+              </a:ext>
+            </a:extLst>
+          </p:cNvPr>
+          <p:cNvSpPr txBox="1"/>
+          <p:nvPr/>
+        </p:nvSpPr>
+        <p:spPr>
+          <a:xfrm>
+            <a:off x="8719373" y="218114"/>
+            <a:ext cx="301686" cy="369332"/>
+          </a:xfrm>
+          <a:prstGeom prst="rect">
+            <a:avLst/>
+          </a:prstGeom>
+          <a:noFill/>
+        </p:spPr>
+        <p:txBody>
+          <a:bodyPr wrap="none" rtlCol="0">
+            <a:spAutoFit/>
+          </a:bodyPr>
+          <a:lstStyle/>
+          <a:p>
+            <a:r>
+              <a:rPr lang="en-US" dirty="0"/>
+              <a:t>2</a:t>
+            </a:r>
+            <a:endParaRPr lang="lt-LT" dirty="0"/>
+          </a:p>
+        </p:txBody>
+      </p:sp>
+      <p:sp>
+        <p:nvSpPr>
+          <p:cNvPr id="16" name="TextBox 15">
+            <a:extLst>
+              <a:ext uri="{FF2B5EF4-FFF2-40B4-BE49-F238E27FC236}">
+                <a16:creationId xmlns:a16="http://schemas.microsoft.com/office/drawing/2014/main" id="{DB21D25A-8912-6098-7C46-3DBCD34B52E0}"/>
+              </a:ext>
+            </a:extLst>
+          </p:cNvPr>
+          <p:cNvSpPr txBox="1"/>
+          <p:nvPr/>
+        </p:nvSpPr>
+        <p:spPr>
+          <a:xfrm>
+            <a:off x="8719373" y="1974744"/>
+            <a:ext cx="301686" cy="369332"/>
+          </a:xfrm>
+          <a:prstGeom prst="rect">
+            <a:avLst/>
+          </a:prstGeom>
+          <a:noFill/>
+        </p:spPr>
+        <p:txBody>
+          <a:bodyPr wrap="none" rtlCol="0">
+            <a:spAutoFit/>
+          </a:bodyPr>
+          <a:lstStyle/>
+          <a:p>
+            <a:r>
+              <a:rPr lang="en-US" dirty="0"/>
+              <a:t>3</a:t>
+            </a:r>
+            <a:endParaRPr lang="lt-LT" dirty="0"/>
+          </a:p>
+        </p:txBody>
+      </p:sp>
+      <p:sp>
+        <p:nvSpPr>
+          <p:cNvPr id="17" name="TextBox 16">
+            <a:extLst>
+              <a:ext uri="{FF2B5EF4-FFF2-40B4-BE49-F238E27FC236}">
+                <a16:creationId xmlns:a16="http://schemas.microsoft.com/office/drawing/2014/main" id="{7B72EE3D-3426-F5F7-0594-FC86D6488F7E}"/>
+              </a:ext>
+            </a:extLst>
+          </p:cNvPr>
+          <p:cNvSpPr txBox="1"/>
+          <p:nvPr/>
+        </p:nvSpPr>
+        <p:spPr>
+          <a:xfrm>
+            <a:off x="8719373" y="5443836"/>
+            <a:ext cx="301686" cy="369332"/>
+          </a:xfrm>
+          <a:prstGeom prst="rect">
+            <a:avLst/>
+          </a:prstGeom>
+          <a:noFill/>
+        </p:spPr>
+        <p:txBody>
+          <a:bodyPr wrap="none" rtlCol="0">
+            <a:spAutoFit/>
+          </a:bodyPr>
+          <a:lstStyle/>
+          <a:p>
+            <a:r>
+              <a:rPr lang="en-US" dirty="0"/>
+              <a:t>4</a:t>
+            </a:r>
+            <a:endParaRPr lang="lt-LT" dirty="0"/>
+          </a:p>
+        </p:txBody>
+      </p:sp>
+      <p:pic>
+        <p:nvPicPr>
+          <p:cNvPr id="19" name="Paveikslėlis 18">
+            <a:extLst>
+              <a:ext uri="{FF2B5EF4-FFF2-40B4-BE49-F238E27FC236}">
+                <a16:creationId xmlns:a16="http://schemas.microsoft.com/office/drawing/2014/main" id="{0D72FFA7-0145-9864-758C-1FCFAE7A1A33}"/>
+              </a:ext>
+            </a:extLst>
+          </p:cNvPr>
+          <p:cNvPicPr>
+            <a:picLocks noChangeAspect="1"/>
+          </p:cNvPicPr>
+          <p:nvPr/>
+        </p:nvPicPr>
+        <p:blipFill>
+          <a:blip r:embed="rId4"/>
+          <a:stretch>
+            <a:fillRect/>
+          </a:stretch>
+        </p:blipFill>
+        <p:spPr>
+          <a:xfrm>
+            <a:off x="501154" y="4937183"/>
+            <a:ext cx="5153025" cy="1543050"/>
+          </a:xfrm>
+          <a:prstGeom prst="rect">
+            <a:avLst/>
+          </a:prstGeom>
+        </p:spPr>
+      </p:pic>
+      <p:pic>
+        <p:nvPicPr>
+          <p:cNvPr id="21" name="Paveikslėlis 20">
+            <a:extLst>
+              <a:ext uri="{FF2B5EF4-FFF2-40B4-BE49-F238E27FC236}">
+                <a16:creationId xmlns:a16="http://schemas.microsoft.com/office/drawing/2014/main" id="{150735E5-F0F0-757B-61A4-96B7B69753CD}"/>
+              </a:ext>
+            </a:extLst>
+          </p:cNvPr>
+          <p:cNvPicPr>
+            <a:picLocks noChangeAspect="1"/>
+          </p:cNvPicPr>
+          <p:nvPr/>
+        </p:nvPicPr>
+        <p:blipFill>
+          <a:blip r:embed="rId5"/>
+          <a:stretch>
+            <a:fillRect/>
+          </a:stretch>
+        </p:blipFill>
+        <p:spPr>
+          <a:xfrm>
+            <a:off x="6536121" y="545499"/>
+            <a:ext cx="4772025" cy="1543050"/>
+          </a:xfrm>
+          <a:prstGeom prst="rect">
+            <a:avLst/>
+          </a:prstGeom>
+        </p:spPr>
+      </p:pic>
     </p:spTree>
     <p:extLst>
       <p:ext uri="{BB962C8B-B14F-4D97-AF65-F5344CB8AC3E}">
@@ -3995,7 +4364,7 @@
           <p:cNvPr id="2" name="Pavadinimas 1">
             <a:extLst>
               <a:ext uri="{FF2B5EF4-FFF2-40B4-BE49-F238E27FC236}">
-                <a16:creationId xmlns:a16="http://schemas.microsoft.com/office/drawing/2014/main" id="{184075CD-AF81-0D83-AF05-6D10D6319443}"/>
+                <a16:creationId xmlns:a16="http://schemas.microsoft.com/office/drawing/2014/main" id="{E225A5E3-62E7-F598-D5C7-C804F41E051C}"/>
               </a:ext>
             </a:extLst>
           </p:cNvPr>
@@ -4008,8 +4377,8 @@
         </p:nvSpPr>
         <p:spPr>
           <a:xfrm>
-            <a:off x="262222" y="326522"/>
-            <a:ext cx="6460796" cy="1325563"/>
+            <a:off x="0" y="18255"/>
+            <a:ext cx="11731305" cy="1325563"/>
           </a:xfrm>
         </p:spPr>
         <p:txBody>
@@ -4017,12 +4386,8 @@
           <a:lstStyle/>
           <a:p>
             <a:r>
-              <a:rPr lang="en-US" dirty="0" err="1"/>
-              <a:t>Liskov</a:t>
-            </a:r>
-            <a:r>
-              <a:rPr lang="en-US" dirty="0"/>
-              <a:t> substitution principle</a:t>
+              <a:rPr lang="en-US" dirty="0"/>
+              <a:t>Open-Closed principle: Composition vs Inheritance </a:t>
             </a:r>
             <a:endParaRPr lang="lt-LT" dirty="0"/>
           </a:p>
@@ -4030,48 +4395,249 @@
       </p:sp>
       <p:sp>
         <p:nvSpPr>
-          <p:cNvPr id="3" name="Turinio vietos rezervavimo ženklas 2">
-            <a:extLst>
-              <a:ext uri="{FF2B5EF4-FFF2-40B4-BE49-F238E27FC236}">
-                <a16:creationId xmlns:a16="http://schemas.microsoft.com/office/drawing/2014/main" id="{7550D0C1-729E-A6DF-92AB-3579773EBB29}"/>
-              </a:ext>
-            </a:extLst>
-          </p:cNvPr>
-          <p:cNvSpPr>
-            <a:spLocks noGrp="1"/>
-          </p:cNvSpPr>
-          <p:nvPr>
-            <p:ph idx="1"/>
-          </p:nvPr>
-        </p:nvSpPr>
-        <p:spPr>
-          <a:xfrm>
-            <a:off x="6460482" y="5725540"/>
-            <a:ext cx="5580016" cy="612186"/>
-          </a:xfrm>
-        </p:spPr>
-        <p:txBody>
-          <a:bodyPr>
-            <a:normAutofit fontScale="55000" lnSpcReduction="20000"/>
+          <p:cNvPr id="4" name="TextBox 3">
+            <a:extLst>
+              <a:ext uri="{FF2B5EF4-FFF2-40B4-BE49-F238E27FC236}">
+                <a16:creationId xmlns:a16="http://schemas.microsoft.com/office/drawing/2014/main" id="{281334A2-037E-1F28-C76F-AD68ECE7643E}"/>
+              </a:ext>
+            </a:extLst>
+          </p:cNvPr>
+          <p:cNvSpPr txBox="1"/>
+          <p:nvPr/>
+        </p:nvSpPr>
+        <p:spPr>
+          <a:xfrm>
+            <a:off x="201335" y="1188333"/>
+            <a:ext cx="6234363" cy="6955750"/>
+          </a:xfrm>
+          <a:prstGeom prst="rect">
+            <a:avLst/>
+          </a:prstGeom>
+          <a:noFill/>
+        </p:spPr>
+        <p:txBody>
+          <a:bodyPr wrap="square" rtlCol="0">
+            <a:spAutoFit/>
           </a:bodyPr>
           <a:lstStyle/>
           <a:p>
-            <a:pPr marL="0" indent="0" algn="ctr">
-              <a:buNone/>
+            <a:r>
+              <a:rPr lang="en-US" sz="2000" dirty="0"/>
+              <a:t>Inheritance</a:t>
+            </a:r>
+          </a:p>
+          <a:p>
+            <a:pPr marL="285750" indent="-285750">
+              <a:buFont typeface="Arial" panose="020B0604020202020204" pitchFamily="34" charset="0"/>
+              <a:buChar char="•"/>
             </a:pPr>
             <a:r>
-              <a:rPr lang="en-US" dirty="0"/>
-              <a:t>It looks like a duck, quacks like a duck, but it needs batteries!</a:t>
-            </a:r>
-          </a:p>
-          <a:p>
-            <a:pPr marL="0" indent="0" algn="ctr">
-              <a:buNone/>
+              <a:rPr lang="en-US" sz="2000" dirty="0"/>
+              <a:t>Strongly couples Parent and Child</a:t>
+            </a:r>
+          </a:p>
+          <a:p>
+            <a:pPr marL="285750" indent="-285750">
+              <a:buFont typeface="Arial" panose="020B0604020202020204" pitchFamily="34" charset="0"/>
+              <a:buChar char="•"/>
             </a:pPr>
             <a:r>
-              <a:rPr lang="en-US" dirty="0"/>
-              <a:t>You probably have the wrong abstraction.</a:t>
-            </a:r>
+              <a:rPr lang="en-US" sz="2000" dirty="0"/>
+              <a:t>New behavior is implemented in Child</a:t>
+            </a:r>
+          </a:p>
+          <a:p>
+            <a:pPr marL="285750" indent="-285750">
+              <a:buFont typeface="Arial" panose="020B0604020202020204" pitchFamily="34" charset="0"/>
+              <a:buChar char="•"/>
+            </a:pPr>
+            <a:r>
+              <a:rPr lang="en-US" sz="2000" dirty="0"/>
+              <a:t>Child is stuck forever with one Parent</a:t>
+            </a:r>
+          </a:p>
+          <a:p>
+            <a:pPr marL="285750" indent="-285750">
+              <a:buFont typeface="Arial" panose="020B0604020202020204" pitchFamily="34" charset="0"/>
+              <a:buChar char="•"/>
+            </a:pPr>
+            <a:r>
+              <a:rPr lang="en-US" sz="2000" dirty="0"/>
+              <a:t>Should not be used as a mean to reuse code</a:t>
+            </a:r>
+          </a:p>
+          <a:p>
+            <a:pPr marL="285750" indent="-285750">
+              <a:buFont typeface="Arial" panose="020B0604020202020204" pitchFamily="34" charset="0"/>
+              <a:buChar char="•"/>
+            </a:pPr>
+            <a:r>
+              <a:rPr lang="en-US" sz="2000" dirty="0"/>
+              <a:t>Should be used as a mean to create logical hierarchies</a:t>
+            </a:r>
+          </a:p>
+          <a:p>
+            <a:pPr marL="285750" indent="-285750">
+              <a:buFont typeface="Arial" panose="020B0604020202020204" pitchFamily="34" charset="0"/>
+              <a:buChar char="•"/>
+            </a:pPr>
+            <a:r>
+              <a:rPr lang="en-US" sz="2000" dirty="0"/>
+              <a:t>Deep inheritance (2+ levels) increases complexity</a:t>
+            </a:r>
+          </a:p>
+          <a:p>
+            <a:pPr marL="285750" indent="-285750">
+              <a:buFont typeface="Arial" panose="020B0604020202020204" pitchFamily="34" charset="0"/>
+              <a:buChar char="•"/>
+            </a:pPr>
+            <a:r>
+              <a:rPr lang="en-US" sz="2000" i="1" dirty="0"/>
+              <a:t>Usually try to </a:t>
+            </a:r>
+            <a:r>
+              <a:rPr lang="en-US" sz="2000" dirty="0"/>
+              <a:t>prefer composition over Inheritance </a:t>
+            </a:r>
+            <a:r>
+              <a:rPr lang="en-US" sz="2000" dirty="0">
+                <a:sym typeface="Wingdings" panose="05000000000000000000" pitchFamily="2" charset="2"/>
+              </a:rPr>
+              <a:t> </a:t>
+            </a:r>
+          </a:p>
+          <a:p>
+            <a:pPr marL="285750" indent="-285750">
+              <a:buFont typeface="Arial" panose="020B0604020202020204" pitchFamily="34" charset="0"/>
+              <a:buChar char="•"/>
+            </a:pPr>
+            <a:endParaRPr lang="en-US" sz="2000" dirty="0">
+              <a:sym typeface="Wingdings" panose="05000000000000000000" pitchFamily="2" charset="2"/>
+            </a:endParaRPr>
+          </a:p>
+          <a:p>
+            <a:r>
+              <a:rPr lang="en-US" sz="2000" dirty="0">
+                <a:sym typeface="Wingdings" panose="05000000000000000000" pitchFamily="2" charset="2"/>
+              </a:rPr>
+              <a:t>Composition</a:t>
+            </a:r>
+          </a:p>
+          <a:p>
+            <a:pPr marL="285750" indent="-285750">
+              <a:buFont typeface="Arial" panose="020B0604020202020204" pitchFamily="34" charset="0"/>
+              <a:buChar char="•"/>
+            </a:pPr>
+            <a:r>
+              <a:rPr lang="en-US" sz="2000" dirty="0">
+                <a:sym typeface="Wingdings" panose="05000000000000000000" pitchFamily="2" charset="2"/>
+              </a:rPr>
+              <a:t>Classes refer to nested objects instead of inheriting them</a:t>
+            </a:r>
+          </a:p>
+          <a:p>
+            <a:pPr marL="285750" indent="-285750">
+              <a:buFont typeface="Arial" panose="020B0604020202020204" pitchFamily="34" charset="0"/>
+              <a:buChar char="•"/>
+            </a:pPr>
+            <a:r>
+              <a:rPr lang="en-US" sz="2000" dirty="0">
+                <a:sym typeface="Wingdings" panose="05000000000000000000" pitchFamily="2" charset="2"/>
+              </a:rPr>
+              <a:t>Class can depend on multiple other objects</a:t>
+            </a:r>
+          </a:p>
+          <a:p>
+            <a:pPr marL="285750" indent="-285750">
+              <a:buFont typeface="Arial" panose="020B0604020202020204" pitchFamily="34" charset="0"/>
+              <a:buChar char="•"/>
+            </a:pPr>
+            <a:r>
+              <a:rPr lang="en-US" sz="2000" dirty="0">
+                <a:sym typeface="Wingdings" panose="05000000000000000000" pitchFamily="2" charset="2"/>
+              </a:rPr>
+              <a:t>Should be used as a mean to reuse code</a:t>
+            </a:r>
+          </a:p>
+          <a:p>
+            <a:pPr marL="285750" indent="-285750">
+              <a:buFont typeface="Arial" panose="020B0604020202020204" pitchFamily="34" charset="0"/>
+              <a:buChar char="•"/>
+            </a:pPr>
+            <a:r>
+              <a:rPr lang="en-US" sz="2000" dirty="0">
+                <a:sym typeface="Wingdings" panose="05000000000000000000" pitchFamily="2" charset="2"/>
+              </a:rPr>
+              <a:t>Loosely coupled objects gives better flexibility</a:t>
+            </a:r>
+          </a:p>
+          <a:p>
+            <a:pPr marL="285750" indent="-285750">
+              <a:buFont typeface="Arial" panose="020B0604020202020204" pitchFamily="34" charset="0"/>
+              <a:buChar char="•"/>
+            </a:pPr>
+            <a:r>
+              <a:rPr lang="en-US" sz="2000" dirty="0">
+                <a:sym typeface="Wingdings" panose="05000000000000000000" pitchFamily="2" charset="2"/>
+              </a:rPr>
+              <a:t>Easier to write unit tests</a:t>
+            </a:r>
+          </a:p>
+          <a:p>
+            <a:pPr marL="285750" indent="-285750">
+              <a:buFont typeface="Arial" panose="020B0604020202020204" pitchFamily="34" charset="0"/>
+              <a:buChar char="•"/>
+            </a:pPr>
+            <a:endParaRPr lang="en-US" dirty="0">
+              <a:sym typeface="Wingdings" panose="05000000000000000000" pitchFamily="2" charset="2"/>
+            </a:endParaRPr>
+          </a:p>
+          <a:p>
+            <a:pPr marL="285750" indent="-285750">
+              <a:buFont typeface="Arial" panose="020B0604020202020204" pitchFamily="34" charset="0"/>
+              <a:buChar char="•"/>
+            </a:pPr>
+            <a:endParaRPr lang="en-US" dirty="0">
+              <a:sym typeface="Wingdings" panose="05000000000000000000" pitchFamily="2" charset="2"/>
+            </a:endParaRPr>
+          </a:p>
+          <a:p>
+            <a:pPr marL="285750" indent="-285750">
+              <a:buFont typeface="Arial" panose="020B0604020202020204" pitchFamily="34" charset="0"/>
+              <a:buChar char="•"/>
+            </a:pPr>
+            <a:endParaRPr lang="en-US" dirty="0">
+              <a:sym typeface="Wingdings" panose="05000000000000000000" pitchFamily="2" charset="2"/>
+            </a:endParaRPr>
+          </a:p>
+          <a:p>
+            <a:pPr marL="285750" indent="-285750">
+              <a:buFont typeface="Arial" panose="020B0604020202020204" pitchFamily="34" charset="0"/>
+              <a:buChar char="•"/>
+            </a:pPr>
+            <a:endParaRPr lang="en-US" dirty="0">
+              <a:sym typeface="Wingdings" panose="05000000000000000000" pitchFamily="2" charset="2"/>
+            </a:endParaRPr>
+          </a:p>
+          <a:p>
+            <a:pPr marL="285750" indent="-285750">
+              <a:buFont typeface="Arial" panose="020B0604020202020204" pitchFamily="34" charset="0"/>
+              <a:buChar char="•"/>
+            </a:pPr>
+            <a:endParaRPr lang="en-US" dirty="0">
+              <a:sym typeface="Wingdings" panose="05000000000000000000" pitchFamily="2" charset="2"/>
+            </a:endParaRPr>
+          </a:p>
+          <a:p>
+            <a:pPr marL="285750" indent="-285750">
+              <a:buFont typeface="Arial" panose="020B0604020202020204" pitchFamily="34" charset="0"/>
+              <a:buChar char="•"/>
+            </a:pPr>
+            <a:endParaRPr lang="en-US" dirty="0">
+              <a:sym typeface="Wingdings" panose="05000000000000000000" pitchFamily="2" charset="2"/>
+            </a:endParaRPr>
+          </a:p>
+          <a:p>
             <a:endParaRPr lang="lt-LT" dirty="0"/>
           </a:p>
         </p:txBody>
@@ -4081,7 +4647,7 @@
           <p:cNvPr id="5" name="Paveikslėlis 4">
             <a:extLst>
               <a:ext uri="{FF2B5EF4-FFF2-40B4-BE49-F238E27FC236}">
-                <a16:creationId xmlns:a16="http://schemas.microsoft.com/office/drawing/2014/main" id="{9987C2B4-3577-D6C2-C25E-D3DD85958638}"/>
+                <a16:creationId xmlns:a16="http://schemas.microsoft.com/office/drawing/2014/main" id="{AA66631E-167F-2634-7A9C-0D315065F44A}"/>
               </a:ext>
             </a:extLst>
           </p:cNvPr>
@@ -4098,71 +4664,48 @@
         </p:blipFill>
         <p:spPr>
           <a:xfrm>
-            <a:off x="6942046" y="372295"/>
-            <a:ext cx="4924178" cy="5167524"/>
+            <a:off x="6435698" y="1076436"/>
+            <a:ext cx="4277034" cy="3113824"/>
           </a:xfrm>
           <a:prstGeom prst="rect">
             <a:avLst/>
           </a:prstGeom>
         </p:spPr>
       </p:pic>
-      <p:sp>
-        <p:nvSpPr>
-          <p:cNvPr id="6" name="TextBox 5">
-            <a:extLst>
-              <a:ext uri="{FF2B5EF4-FFF2-40B4-BE49-F238E27FC236}">
-                <a16:creationId xmlns:a16="http://schemas.microsoft.com/office/drawing/2014/main" id="{0F5F5465-DE06-7A05-43D6-D1CB0A9BB568}"/>
-              </a:ext>
-            </a:extLst>
-          </p:cNvPr>
-          <p:cNvSpPr txBox="1"/>
+      <p:pic>
+        <p:nvPicPr>
+          <p:cNvPr id="6" name="Paveikslėlis 5">
+            <a:extLst>
+              <a:ext uri="{FF2B5EF4-FFF2-40B4-BE49-F238E27FC236}">
+                <a16:creationId xmlns:a16="http://schemas.microsoft.com/office/drawing/2014/main" id="{012ACF5A-A7F5-1BA1-8960-284AC55CC54F}"/>
+              </a:ext>
+            </a:extLst>
+          </p:cNvPr>
+          <p:cNvPicPr>
+            <a:picLocks noChangeAspect="1"/>
+          </p:cNvPicPr>
           <p:nvPr/>
-        </p:nvSpPr>
-        <p:spPr>
-          <a:xfrm>
-            <a:off x="595741" y="2143899"/>
-            <a:ext cx="6127277" cy="1261884"/>
+        </p:nvPicPr>
+        <p:blipFill>
+          <a:blip r:embed="rId3"/>
+          <a:stretch>
+            <a:fillRect/>
+          </a:stretch>
+        </p:blipFill>
+        <p:spPr>
+          <a:xfrm>
+            <a:off x="6435698" y="4566460"/>
+            <a:ext cx="4772025" cy="1543050"/>
           </a:xfrm>
           <a:prstGeom prst="rect">
             <a:avLst/>
           </a:prstGeom>
-          <a:noFill/>
-        </p:spPr>
-        <p:txBody>
-          <a:bodyPr wrap="square" rtlCol="0">
-            <a:spAutoFit/>
-          </a:bodyPr>
-          <a:lstStyle/>
-          <a:p>
-            <a:r>
-              <a:rPr lang="en-US" sz="2000" u="sng" dirty="0"/>
-              <a:t>Objects of a superclass shall be replaceable with objects of its subclasses without breaking the application</a:t>
-            </a:r>
-            <a:r>
-              <a:rPr lang="en-US" sz="2000" dirty="0"/>
-              <a:t>.</a:t>
-            </a:r>
-          </a:p>
-          <a:p>
-            <a:br>
-              <a:rPr lang="en-US" u="sng" dirty="0"/>
-            </a:br>
-            <a:r>
-              <a:rPr lang="en-US" dirty="0"/>
-              <a:t>TLDR; </a:t>
-            </a:r>
-            <a:r>
-              <a:rPr lang="en-US" i="1" dirty="0"/>
-              <a:t>Use derived classes without knowing it.</a:t>
-            </a:r>
-            <a:endParaRPr lang="lt-LT" dirty="0"/>
-          </a:p>
-        </p:txBody>
-      </p:sp>
+        </p:spPr>
+      </p:pic>
     </p:spTree>
     <p:extLst>
       <p:ext uri="{BB962C8B-B14F-4D97-AF65-F5344CB8AC3E}">
-        <p14:creationId xmlns:p14="http://schemas.microsoft.com/office/powerpoint/2010/main" val="1219901685"/>
+        <p14:creationId xmlns:p14="http://schemas.microsoft.com/office/powerpoint/2010/main" val="2290472021"/>
       </p:ext>
     </p:extLst>
   </p:cSld>
@@ -4207,8 +4750,8 @@
         </p:nvSpPr>
         <p:spPr>
           <a:xfrm>
-            <a:off x="280852" y="149724"/>
-            <a:ext cx="10515600" cy="1325563"/>
+            <a:off x="262222" y="326522"/>
+            <a:ext cx="6460796" cy="1325563"/>
           </a:xfrm>
         </p:spPr>
         <p:txBody>
@@ -4216,8 +4759,12 @@
           <a:lstStyle/>
           <a:p>
             <a:r>
-              <a:rPr lang="en-US" dirty="0"/>
-              <a:t>Interface Segregation principle</a:t>
+              <a:rPr lang="en-US" dirty="0" err="1"/>
+              <a:t>Liskov</a:t>
+            </a:r>
+            <a:r>
+              <a:rPr lang="en-US" dirty="0"/>
+              <a:t> Substitution principle</a:t>
             </a:r>
             <a:endParaRPr lang="lt-LT" dirty="0"/>
           </a:p>
@@ -4241,22 +4788,33 @@
         </p:nvSpPr>
         <p:spPr>
           <a:xfrm>
-            <a:off x="838199" y="3135085"/>
-            <a:ext cx="5519057" cy="3041877"/>
-          </a:xfrm>
-        </p:spPr>
-        <p:txBody>
-          <a:bodyPr/>
-          <a:lstStyle/>
-          <a:p>
-            <a:pPr marL="0" indent="0">
+            <a:off x="6460482" y="5725540"/>
+            <a:ext cx="5580016" cy="612186"/>
+          </a:xfrm>
+        </p:spPr>
+        <p:txBody>
+          <a:bodyPr>
+            <a:normAutofit fontScale="55000" lnSpcReduction="20000"/>
+          </a:bodyPr>
+          <a:lstStyle/>
+          <a:p>
+            <a:pPr marL="0" indent="0" algn="ctr">
               <a:buNone/>
             </a:pPr>
             <a:r>
-              <a:rPr lang="en-US" u="sng" dirty="0"/>
-              <a:t>Fine grained client-specific interfaces</a:t>
-            </a:r>
-            <a:endParaRPr lang="lt-LT" u="sng" dirty="0"/>
+              <a:rPr lang="en-US" dirty="0"/>
+              <a:t>It looks like a duck, quacks like a duck, but it needs batteries!</a:t>
+            </a:r>
+          </a:p>
+          <a:p>
+            <a:pPr marL="0" indent="0" algn="ctr">
+              <a:buNone/>
+            </a:pPr>
+            <a:r>
+              <a:rPr lang="en-US" dirty="0"/>
+              <a:t>You probably have the wrong abstraction.</a:t>
+            </a:r>
+            <a:endParaRPr lang="lt-LT" dirty="0"/>
           </a:p>
         </p:txBody>
       </p:sp>
@@ -4265,7 +4823,7 @@
           <p:cNvPr id="5" name="Paveikslėlis 4">
             <a:extLst>
               <a:ext uri="{FF2B5EF4-FFF2-40B4-BE49-F238E27FC236}">
-                <a16:creationId xmlns:a16="http://schemas.microsoft.com/office/drawing/2014/main" id="{21030A4F-DF7F-453B-7F78-C9CEF4B2E1AF}"/>
+                <a16:creationId xmlns:a16="http://schemas.microsoft.com/office/drawing/2014/main" id="{9987C2B4-3577-D6C2-C25E-D3DD85958638}"/>
               </a:ext>
             </a:extLst>
           </p:cNvPr>
@@ -4282,8 +4840,8 @@
         </p:blipFill>
         <p:spPr>
           <a:xfrm>
-            <a:off x="7228114" y="1145189"/>
-            <a:ext cx="4604657" cy="4567622"/>
+            <a:off x="6942046" y="372295"/>
+            <a:ext cx="4924178" cy="5167524"/>
           </a:xfrm>
           <a:prstGeom prst="rect">
             <a:avLst/>
@@ -4295,7 +4853,7 @@
           <p:cNvPr id="6" name="TextBox 5">
             <a:extLst>
               <a:ext uri="{FF2B5EF4-FFF2-40B4-BE49-F238E27FC236}">
-                <a16:creationId xmlns:a16="http://schemas.microsoft.com/office/drawing/2014/main" id="{A246F5E6-3581-FE21-C5E6-2C42B3886473}"/>
+                <a16:creationId xmlns:a16="http://schemas.microsoft.com/office/drawing/2014/main" id="{0F5F5465-DE06-7A05-43D6-D1CB0A9BB568}"/>
               </a:ext>
             </a:extLst>
           </p:cNvPr>
@@ -4304,8 +4862,8 @@
         </p:nvSpPr>
         <p:spPr>
           <a:xfrm>
-            <a:off x="7522132" y="5992297"/>
-            <a:ext cx="4669868" cy="369332"/>
+            <a:off x="595741" y="2143899"/>
+            <a:ext cx="6127277" cy="1261884"/>
           </a:xfrm>
           <a:prstGeom prst="rect">
             <a:avLst/>
@@ -4313,14 +4871,31 @@
           <a:noFill/>
         </p:spPr>
         <p:txBody>
-          <a:bodyPr wrap="none" rtlCol="0">
+          <a:bodyPr wrap="square" rtlCol="0">
             <a:spAutoFit/>
           </a:bodyPr>
           <a:lstStyle/>
           <a:p>
             <a:r>
-              <a:rPr lang="en-US" dirty="0"/>
-              <a:t>There is no combined power &amp; water connector</a:t>
+              <a:rPr lang="en-US" sz="2000" u="sng" dirty="0"/>
+              <a:t>Objects of a superclass shall be replaceable with objects of its subclasses without breaking the application</a:t>
+            </a:r>
+            <a:r>
+              <a:rPr lang="en-US" sz="2000" dirty="0"/>
+              <a:t>.</a:t>
+            </a:r>
+          </a:p>
+          <a:p>
+            <a:br>
+              <a:rPr lang="en-US" u="sng" dirty="0"/>
+            </a:br>
+            <a:r>
+              <a:rPr lang="en-US" dirty="0"/>
+              <a:t>TLDR; </a:t>
+            </a:r>
+            <a:r>
+              <a:rPr lang="en-US" i="1" dirty="0"/>
+              <a:t>Use derived classes without knowing it.</a:t>
             </a:r>
             <a:endParaRPr lang="lt-LT" dirty="0"/>
           </a:p>
@@ -4329,7 +4904,7 @@
     </p:spTree>
     <p:extLst>
       <p:ext uri="{BB962C8B-B14F-4D97-AF65-F5344CB8AC3E}">
-        <p14:creationId xmlns:p14="http://schemas.microsoft.com/office/powerpoint/2010/main" val="2006682548"/>
+        <p14:creationId xmlns:p14="http://schemas.microsoft.com/office/powerpoint/2010/main" val="1219901685"/>
       </p:ext>
     </p:extLst>
   </p:cSld>
@@ -4374,8 +4949,8 @@
         </p:nvSpPr>
         <p:spPr>
           <a:xfrm>
-            <a:off x="286839" y="167957"/>
-            <a:ext cx="10515600" cy="1325563"/>
+            <a:off x="262222" y="-63099"/>
+            <a:ext cx="6460796" cy="1325563"/>
           </a:xfrm>
         </p:spPr>
         <p:txBody>
@@ -4383,8 +4958,12 @@
           <a:lstStyle/>
           <a:p>
             <a:r>
-              <a:rPr lang="en-US" dirty="0"/>
-              <a:t>Dependency Inversion principle</a:t>
+              <a:rPr lang="en-US" dirty="0" err="1"/>
+              <a:t>Liskov</a:t>
+            </a:r>
+            <a:r>
+              <a:rPr lang="en-US" dirty="0"/>
+              <a:t> Substitution principle</a:t>
             </a:r>
             <a:endParaRPr lang="lt-LT" dirty="0"/>
           </a:p>
@@ -4392,47 +4971,46 @@
       </p:sp>
       <p:sp>
         <p:nvSpPr>
-          <p:cNvPr id="3" name="Turinio vietos rezervavimo ženklas 2">
-            <a:extLst>
-              <a:ext uri="{FF2B5EF4-FFF2-40B4-BE49-F238E27FC236}">
-                <a16:creationId xmlns:a16="http://schemas.microsoft.com/office/drawing/2014/main" id="{7550D0C1-729E-A6DF-92AB-3579773EBB29}"/>
-              </a:ext>
-            </a:extLst>
-          </p:cNvPr>
-          <p:cNvSpPr>
-            <a:spLocks noGrp="1"/>
-          </p:cNvSpPr>
-          <p:nvPr>
-            <p:ph idx="1"/>
-          </p:nvPr>
-        </p:nvSpPr>
-        <p:spPr>
-          <a:xfrm>
-            <a:off x="519590" y="2664823"/>
-            <a:ext cx="4822371" cy="3520049"/>
-          </a:xfrm>
-        </p:spPr>
-        <p:txBody>
-          <a:bodyPr/>
-          <a:lstStyle/>
-          <a:p>
-            <a:pPr marL="0" indent="0">
-              <a:buNone/>
-            </a:pPr>
-            <a:r>
-              <a:rPr lang="en-US" u="sng" dirty="0"/>
-              <a:t>Depend on abstractions, not concrete implementations.</a:t>
-            </a:r>
-            <a:endParaRPr lang="lt-LT" u="sng" dirty="0"/>
+          <p:cNvPr id="6" name="TextBox 5">
+            <a:extLst>
+              <a:ext uri="{FF2B5EF4-FFF2-40B4-BE49-F238E27FC236}">
+                <a16:creationId xmlns:a16="http://schemas.microsoft.com/office/drawing/2014/main" id="{0F5F5465-DE06-7A05-43D6-D1CB0A9BB568}"/>
+              </a:ext>
+            </a:extLst>
+          </p:cNvPr>
+          <p:cNvSpPr txBox="1"/>
+          <p:nvPr/>
+        </p:nvSpPr>
+        <p:spPr>
+          <a:xfrm>
+            <a:off x="7481983" y="3361955"/>
+            <a:ext cx="6127277" cy="369332"/>
+          </a:xfrm>
+          <a:prstGeom prst="rect">
+            <a:avLst/>
+          </a:prstGeom>
+          <a:noFill/>
+        </p:spPr>
+        <p:txBody>
+          <a:bodyPr wrap="square" rtlCol="0">
+            <a:spAutoFit/>
+          </a:bodyPr>
+          <a:lstStyle/>
+          <a:p>
+            <a:r>
+              <a:rPr lang="en-US" i="1" dirty="0"/>
+              <a:t>Use derived classes without knowing it.</a:t>
+            </a:r>
+            <a:endParaRPr lang="lt-LT" dirty="0"/>
           </a:p>
         </p:txBody>
       </p:sp>
       <p:pic>
         <p:nvPicPr>
-          <p:cNvPr id="5" name="Paveikslėlis 4">
-            <a:extLst>
-              <a:ext uri="{FF2B5EF4-FFF2-40B4-BE49-F238E27FC236}">
-                <a16:creationId xmlns:a16="http://schemas.microsoft.com/office/drawing/2014/main" id="{58A4B17D-A496-E6D6-59C3-E05EB63321EB}"/>
+          <p:cNvPr id="8" name="Paveikslėlis 7">
+            <a:extLst>
+              <a:ext uri="{FF2B5EF4-FFF2-40B4-BE49-F238E27FC236}">
+                <a16:creationId xmlns:a16="http://schemas.microsoft.com/office/drawing/2014/main" id="{6DCDBB48-E0C6-6A1B-D8C9-4C1998E32BC4}"/>
               </a:ext>
             </a:extLst>
           </p:cNvPr>
@@ -4449,8 +5027,8 @@
         </p:blipFill>
         <p:spPr>
           <a:xfrm>
-            <a:off x="5544639" y="1687467"/>
-            <a:ext cx="6598580" cy="4118791"/>
+            <a:off x="6933342" y="3731287"/>
+            <a:ext cx="4277034" cy="3113824"/>
           </a:xfrm>
           <a:prstGeom prst="rect">
             <a:avLst/>
@@ -4459,10 +5037,10 @@
       </p:pic>
       <p:sp>
         <p:nvSpPr>
-          <p:cNvPr id="6" name="TextBox 5">
-            <a:extLst>
-              <a:ext uri="{FF2B5EF4-FFF2-40B4-BE49-F238E27FC236}">
-                <a16:creationId xmlns:a16="http://schemas.microsoft.com/office/drawing/2014/main" id="{CC0444F3-6571-5819-6DF8-B64A37C5D011}"/>
+          <p:cNvPr id="3" name="TextBox 2">
+            <a:extLst>
+              <a:ext uri="{FF2B5EF4-FFF2-40B4-BE49-F238E27FC236}">
+                <a16:creationId xmlns:a16="http://schemas.microsoft.com/office/drawing/2014/main" id="{61B466B5-D949-2D79-FD68-D87C67454514}"/>
               </a:ext>
             </a:extLst>
           </p:cNvPr>
@@ -4471,8 +5049,8 @@
         </p:nvSpPr>
         <p:spPr>
           <a:xfrm>
-            <a:off x="6783977" y="6000206"/>
-            <a:ext cx="4794711" cy="369332"/>
+            <a:off x="322747" y="1148244"/>
+            <a:ext cx="6339746" cy="4247317"/>
           </a:xfrm>
           <a:prstGeom prst="rect">
             <a:avLst/>
@@ -4480,23 +5058,117 @@
           <a:noFill/>
         </p:spPr>
         <p:txBody>
-          <a:bodyPr wrap="none" rtlCol="0">
+          <a:bodyPr wrap="square" rtlCol="0">
             <a:spAutoFit/>
           </a:bodyPr>
           <a:lstStyle/>
           <a:p>
             <a:r>
               <a:rPr lang="en-US" dirty="0"/>
-              <a:t>Excavator design doesn’t depend on attachments</a:t>
-            </a:r>
-            <a:endParaRPr lang="lt-LT" dirty="0"/>
-          </a:p>
-        </p:txBody>
-      </p:sp>
+              <a:t>Any class that is the child of a parent class should be usable in place of its parent </a:t>
+            </a:r>
+            <a:r>
+              <a:rPr lang="en-US" b="1" u="sng" dirty="0"/>
+              <a:t>without any unexpected behavior</a:t>
+            </a:r>
+          </a:p>
+          <a:p>
+            <a:endParaRPr lang="en-US" dirty="0"/>
+          </a:p>
+          <a:p>
+            <a:r>
+              <a:rPr lang="en-US" dirty="0"/>
+              <a:t>Subtyping: implementing a class which follows requirements specified by an interface. </a:t>
+            </a:r>
+          </a:p>
+          <a:p>
+            <a:endParaRPr lang="en-US" dirty="0"/>
+          </a:p>
+          <a:p>
+            <a:r>
+              <a:rPr lang="en-US" dirty="0"/>
+              <a:t>Inheritance: implementing a Child class that specializes Parent class to a particular use, by reusing it’s behavior and possibly overriding parts of it. </a:t>
+            </a:r>
+          </a:p>
+          <a:p>
+            <a:pPr marL="285750" indent="-285750">
+              <a:buFont typeface="Arial" panose="020B0604020202020204" pitchFamily="34" charset="0"/>
+              <a:buChar char="•"/>
+            </a:pPr>
+            <a:r>
+              <a:rPr lang="en-US" dirty="0"/>
+              <a:t>Behavior reuse (or override) should be easy to justify</a:t>
+            </a:r>
+          </a:p>
+          <a:p>
+            <a:pPr marL="285750" indent="-285750">
+              <a:buFont typeface="Arial" panose="020B0604020202020204" pitchFamily="34" charset="0"/>
+              <a:buChar char="•"/>
+            </a:pPr>
+            <a:r>
+              <a:rPr lang="en-US" dirty="0"/>
+              <a:t>Good for enforcing business logic, creating real world relations</a:t>
+            </a:r>
+          </a:p>
+          <a:p>
+            <a:pPr marL="285750" indent="-285750">
+              <a:buFont typeface="Arial" panose="020B0604020202020204" pitchFamily="34" charset="0"/>
+              <a:buChar char="•"/>
+            </a:pPr>
+            <a:r>
+              <a:rPr lang="en-US" dirty="0"/>
+              <a:t>Allows creating restrictions that must be followed</a:t>
+            </a:r>
+          </a:p>
+          <a:p>
+            <a:pPr marL="285750" indent="-285750">
+              <a:buFont typeface="Arial" panose="020B0604020202020204" pitchFamily="34" charset="0"/>
+              <a:buChar char="•"/>
+            </a:pPr>
+            <a:endParaRPr lang="en-US" dirty="0"/>
+          </a:p>
+          <a:p>
+            <a:r>
+              <a:rPr lang="en-US" dirty="0"/>
+              <a:t>What do you think about the example on the right in terms for enforcing business logic? </a:t>
+            </a:r>
+          </a:p>
+        </p:txBody>
+      </p:sp>
+      <p:pic>
+        <p:nvPicPr>
+          <p:cNvPr id="11" name="Paveikslėlis 10">
+            <a:extLst>
+              <a:ext uri="{FF2B5EF4-FFF2-40B4-BE49-F238E27FC236}">
+                <a16:creationId xmlns:a16="http://schemas.microsoft.com/office/drawing/2014/main" id="{3CA67A03-D746-25ED-437E-CFDBA83EB936}"/>
+              </a:ext>
+            </a:extLst>
+          </p:cNvPr>
+          <p:cNvPicPr>
+            <a:picLocks noChangeAspect="1"/>
+          </p:cNvPicPr>
+          <p:nvPr/>
+        </p:nvPicPr>
+        <p:blipFill>
+          <a:blip r:embed="rId3"/>
+          <a:stretch>
+            <a:fillRect/>
+          </a:stretch>
+        </p:blipFill>
+        <p:spPr>
+          <a:xfrm>
+            <a:off x="6933342" y="12889"/>
+            <a:ext cx="4633817" cy="3026770"/>
+          </a:xfrm>
+          <a:prstGeom prst="rect">
+            <a:avLst/>
+          </a:prstGeom>
+        </p:spPr>
+      </p:pic>
     </p:spTree>
     <p:extLst>
       <p:ext uri="{BB962C8B-B14F-4D97-AF65-F5344CB8AC3E}">
-        <p14:creationId xmlns:p14="http://schemas.microsoft.com/office/powerpoint/2010/main" val="2656473725"/>
+        <p14:creationId xmlns:p14="http://schemas.microsoft.com/office/powerpoint/2010/main" val="2257348093"/>
       </p:ext>
     </p:extLst>
   </p:cSld>
@@ -4539,15 +5211,23 @@
             <p:ph type="title"/>
           </p:nvPr>
         </p:nvSpPr>
-        <p:spPr/>
+        <p:spPr>
+          <a:xfrm>
+            <a:off x="262222" y="190720"/>
+            <a:ext cx="6460796" cy="1325563"/>
+          </a:xfrm>
+        </p:spPr>
         <p:txBody>
           <a:bodyPr/>
           <a:lstStyle/>
           <a:p>
-            <a:pPr algn="ctr"/>
-            <a:r>
-              <a:rPr lang="en-US" dirty="0"/>
-              <a:t>Workshop time!</a:t>
+            <a:r>
+              <a:rPr lang="en-US" dirty="0" err="1"/>
+              <a:t>Liskov</a:t>
+            </a:r>
+            <a:r>
+              <a:rPr lang="en-US" dirty="0"/>
+              <a:t> Substitution principle</a:t>
             </a:r>
             <a:endParaRPr lang="lt-LT" dirty="0"/>
           </a:p>
@@ -4555,10 +5235,10 @@
       </p:sp>
       <p:pic>
         <p:nvPicPr>
-          <p:cNvPr id="5" name="Paveikslėlis 4">
-            <a:extLst>
-              <a:ext uri="{FF2B5EF4-FFF2-40B4-BE49-F238E27FC236}">
-                <a16:creationId xmlns:a16="http://schemas.microsoft.com/office/drawing/2014/main" id="{CBFBD389-2B23-8630-8064-84A7A2193B82}"/>
+          <p:cNvPr id="7" name="Paveikslėlis 6">
+            <a:extLst>
+              <a:ext uri="{FF2B5EF4-FFF2-40B4-BE49-F238E27FC236}">
+                <a16:creationId xmlns:a16="http://schemas.microsoft.com/office/drawing/2014/main" id="{BA2B77D7-E390-1A28-5093-66FE3DD2B15E}"/>
               </a:ext>
             </a:extLst>
           </p:cNvPr>
@@ -4568,21 +5248,197 @@
           <p:nvPr/>
         </p:nvPicPr>
         <p:blipFill>
-          <a:blip r:embed="rId2">
-            <a:extLst>
-              <a:ext uri="{28A0092B-C50C-407E-A947-70E740481C1C}">
-                <a14:useLocalDpi xmlns:a14="http://schemas.microsoft.com/office/drawing/2010/main" val="0"/>
-              </a:ext>
-            </a:extLst>
-          </a:blip>
+          <a:blip r:embed="rId2"/>
           <a:stretch>
             <a:fillRect/>
           </a:stretch>
         </p:blipFill>
         <p:spPr>
           <a:xfrm>
-            <a:off x="1694362" y="1604791"/>
-            <a:ext cx="8803276" cy="4736545"/>
+            <a:off x="1565921" y="1516283"/>
+            <a:ext cx="2716368" cy="2274168"/>
+          </a:xfrm>
+          <a:prstGeom prst="rect">
+            <a:avLst/>
+          </a:prstGeom>
+        </p:spPr>
+      </p:pic>
+      <p:sp>
+        <p:nvSpPr>
+          <p:cNvPr id="12" name="TextBox 11">
+            <a:extLst>
+              <a:ext uri="{FF2B5EF4-FFF2-40B4-BE49-F238E27FC236}">
+                <a16:creationId xmlns:a16="http://schemas.microsoft.com/office/drawing/2014/main" id="{05DF970E-46D7-45B1-4FF7-9EAC2FCDE75C}"/>
+              </a:ext>
+            </a:extLst>
+          </p:cNvPr>
+          <p:cNvSpPr txBox="1"/>
+          <p:nvPr/>
+        </p:nvSpPr>
+        <p:spPr>
+          <a:xfrm>
+            <a:off x="209258" y="4423968"/>
+            <a:ext cx="5849836" cy="1477328"/>
+          </a:xfrm>
+          <a:prstGeom prst="rect">
+            <a:avLst/>
+          </a:prstGeom>
+          <a:noFill/>
+        </p:spPr>
+        <p:txBody>
+          <a:bodyPr wrap="square" rtlCol="0">
+            <a:spAutoFit/>
+          </a:bodyPr>
+          <a:lstStyle/>
+          <a:p>
+            <a:pPr marL="285750" indent="-285750">
+              <a:buFont typeface="Arial" panose="020B0604020202020204" pitchFamily="34" charset="0"/>
+              <a:buChar char="•"/>
+            </a:pPr>
+            <a:r>
+              <a:rPr lang="en-US" dirty="0"/>
+              <a:t>Resembles real-life relation (they are all Birds)</a:t>
+            </a:r>
+          </a:p>
+          <a:p>
+            <a:pPr marL="285750" indent="-285750">
+              <a:buFont typeface="Arial" panose="020B0604020202020204" pitchFamily="34" charset="0"/>
+              <a:buChar char="•"/>
+            </a:pPr>
+            <a:r>
+              <a:rPr lang="en-US" dirty="0"/>
+              <a:t>Gives restrictions that are followed (Lay an Egg and Fly)</a:t>
+            </a:r>
+          </a:p>
+          <a:p>
+            <a:pPr marL="285750" indent="-285750">
+              <a:buFont typeface="Arial" panose="020B0604020202020204" pitchFamily="34" charset="0"/>
+              <a:buChar char="•"/>
+            </a:pPr>
+            <a:r>
+              <a:rPr lang="en-US" dirty="0"/>
+              <a:t>But what happens when Penguin or Ostrich tries to Fly?</a:t>
+            </a:r>
+          </a:p>
+          <a:p>
+            <a:pPr marL="285750" indent="-285750">
+              <a:buFont typeface="Arial" panose="020B0604020202020204" pitchFamily="34" charset="0"/>
+              <a:buChar char="•"/>
+            </a:pPr>
+            <a:r>
+              <a:rPr lang="en-US" dirty="0"/>
+              <a:t>Parent and Child classes are not interchangeable.</a:t>
+            </a:r>
+          </a:p>
+          <a:p>
+            <a:pPr marL="285750" indent="-285750">
+              <a:buFont typeface="Arial" panose="020B0604020202020204" pitchFamily="34" charset="0"/>
+              <a:buChar char="•"/>
+            </a:pPr>
+            <a:endParaRPr lang="lt-LT" dirty="0"/>
+          </a:p>
+        </p:txBody>
+      </p:sp>
+      <p:sp>
+        <p:nvSpPr>
+          <p:cNvPr id="13" name="TextBox 12">
+            <a:extLst>
+              <a:ext uri="{FF2B5EF4-FFF2-40B4-BE49-F238E27FC236}">
+                <a16:creationId xmlns:a16="http://schemas.microsoft.com/office/drawing/2014/main" id="{041D5FD7-EF74-F00E-39E9-65E2850B17E1}"/>
+              </a:ext>
+            </a:extLst>
+          </p:cNvPr>
+          <p:cNvSpPr txBox="1"/>
+          <p:nvPr/>
+        </p:nvSpPr>
+        <p:spPr>
+          <a:xfrm>
+            <a:off x="6418426" y="4423968"/>
+            <a:ext cx="5773574" cy="1754326"/>
+          </a:xfrm>
+          <a:prstGeom prst="rect">
+            <a:avLst/>
+          </a:prstGeom>
+          <a:noFill/>
+        </p:spPr>
+        <p:txBody>
+          <a:bodyPr wrap="square" rtlCol="0">
+            <a:spAutoFit/>
+          </a:bodyPr>
+          <a:lstStyle/>
+          <a:p>
+            <a:pPr marL="285750" indent="-285750">
+              <a:buFont typeface="Arial" panose="020B0604020202020204" pitchFamily="34" charset="0"/>
+              <a:buChar char="•"/>
+            </a:pPr>
+            <a:r>
+              <a:rPr lang="en-US" dirty="0"/>
+              <a:t>Resembles real-life relation (they are all Birds)</a:t>
+            </a:r>
+          </a:p>
+          <a:p>
+            <a:pPr marL="285750" indent="-285750">
+              <a:buFont typeface="Arial" panose="020B0604020202020204" pitchFamily="34" charset="0"/>
+              <a:buChar char="•"/>
+            </a:pPr>
+            <a:r>
+              <a:rPr lang="en-US" dirty="0"/>
+              <a:t>Gives restriction that are followed (all can Lay an Egg and some can Fly) </a:t>
+            </a:r>
+          </a:p>
+          <a:p>
+            <a:pPr marL="285750" indent="-285750">
+              <a:buFont typeface="Arial" panose="020B0604020202020204" pitchFamily="34" charset="0"/>
+              <a:buChar char="•"/>
+            </a:pPr>
+            <a:r>
+              <a:rPr lang="en-US" dirty="0"/>
+              <a:t>Parent and Child classes are interchangeable.</a:t>
+            </a:r>
+          </a:p>
+          <a:p>
+            <a:pPr marL="285750" indent="-285750">
+              <a:buFont typeface="Arial" panose="020B0604020202020204" pitchFamily="34" charset="0"/>
+              <a:buChar char="•"/>
+            </a:pPr>
+            <a:r>
+              <a:rPr lang="en-US" dirty="0"/>
+              <a:t>Be cautious about growing inheritance depth.</a:t>
+            </a:r>
+          </a:p>
+          <a:p>
+            <a:pPr marL="285750" indent="-285750">
+              <a:buFont typeface="Arial" panose="020B0604020202020204" pitchFamily="34" charset="0"/>
+              <a:buChar char="•"/>
+            </a:pPr>
+            <a:endParaRPr lang="lt-LT" dirty="0"/>
+          </a:p>
+        </p:txBody>
+      </p:sp>
+      <p:pic>
+        <p:nvPicPr>
+          <p:cNvPr id="15" name="Paveikslėlis 14">
+            <a:extLst>
+              <a:ext uri="{FF2B5EF4-FFF2-40B4-BE49-F238E27FC236}">
+                <a16:creationId xmlns:a16="http://schemas.microsoft.com/office/drawing/2014/main" id="{7860E384-7D4E-AC71-2E0C-4395167010A2}"/>
+              </a:ext>
+            </a:extLst>
+          </p:cNvPr>
+          <p:cNvPicPr>
+            <a:picLocks noChangeAspect="1"/>
+          </p:cNvPicPr>
+          <p:nvPr/>
+        </p:nvPicPr>
+        <p:blipFill>
+          <a:blip r:embed="rId3"/>
+          <a:stretch>
+            <a:fillRect/>
+          </a:stretch>
+        </p:blipFill>
+        <p:spPr>
+          <a:xfrm>
+            <a:off x="7139695" y="1516283"/>
+            <a:ext cx="2828170" cy="2795284"/>
           </a:xfrm>
           <a:prstGeom prst="rect">
             <a:avLst/>
@@ -4592,7 +5448,7 @@
     </p:spTree>
     <p:extLst>
       <p:ext uri="{BB962C8B-B14F-4D97-AF65-F5344CB8AC3E}">
-        <p14:creationId xmlns:p14="http://schemas.microsoft.com/office/powerpoint/2010/main" val="2211100357"/>
+        <p14:creationId xmlns:p14="http://schemas.microsoft.com/office/powerpoint/2010/main" val="3411169473"/>
       </p:ext>
     </p:extLst>
   </p:cSld>
@@ -4624,7 +5480,7 @@
           <p:cNvPr id="2" name="Pavadinimas 1">
             <a:extLst>
               <a:ext uri="{FF2B5EF4-FFF2-40B4-BE49-F238E27FC236}">
-                <a16:creationId xmlns:a16="http://schemas.microsoft.com/office/drawing/2014/main" id="{D644839F-31A3-14B9-F092-724C03D64C4B}"/>
+                <a16:creationId xmlns:a16="http://schemas.microsoft.com/office/drawing/2014/main" id="{184075CD-AF81-0D83-AF05-6D10D6319443}"/>
               </a:ext>
             </a:extLst>
           </p:cNvPr>
@@ -4635,14 +5491,19 @@
             <p:ph type="title"/>
           </p:nvPr>
         </p:nvSpPr>
-        <p:spPr/>
+        <p:spPr>
+          <a:xfrm>
+            <a:off x="280852" y="149724"/>
+            <a:ext cx="10515600" cy="1325563"/>
+          </a:xfrm>
+        </p:spPr>
         <p:txBody>
           <a:bodyPr/>
           <a:lstStyle/>
           <a:p>
             <a:r>
               <a:rPr lang="en-US" dirty="0"/>
-              <a:t>Useful links</a:t>
+              <a:t>Interface Segregation principle</a:t>
             </a:r>
             <a:endParaRPr lang="lt-LT" dirty="0"/>
           </a:p>
@@ -4653,7 +5514,7 @@
           <p:cNvPr id="3" name="Turinio vietos rezervavimo ženklas 2">
             <a:extLst>
               <a:ext uri="{FF2B5EF4-FFF2-40B4-BE49-F238E27FC236}">
-                <a16:creationId xmlns:a16="http://schemas.microsoft.com/office/drawing/2014/main" id="{E45A490F-C277-746C-3912-F62AC00E589B}"/>
+                <a16:creationId xmlns:a16="http://schemas.microsoft.com/office/drawing/2014/main" id="{7550D0C1-729E-A6DF-92AB-3579773EBB29}"/>
               </a:ext>
             </a:extLst>
           </p:cNvPr>
@@ -4664,20 +5525,89 @@
             <p:ph idx="1"/>
           </p:nvPr>
         </p:nvSpPr>
-        <p:spPr/>
+        <p:spPr>
+          <a:xfrm>
+            <a:off x="838199" y="3135085"/>
+            <a:ext cx="5519057" cy="3041877"/>
+          </a:xfrm>
+        </p:spPr>
         <p:txBody>
           <a:bodyPr/>
           <a:lstStyle/>
           <a:p>
-            <a:r>
-              <a:rPr lang="en-US" dirty="0">
-                <a:hlinkClick r:id="rId2"/>
-              </a:rPr>
-              <a:t>https://github.com/Almantask/CSharp-From-Zero-To-Hero/</a:t>
-            </a:r>
-            <a:endParaRPr lang="en-US" dirty="0"/>
-          </a:p>
-          <a:p>
+            <a:pPr marL="0" indent="0">
+              <a:buNone/>
+            </a:pPr>
+            <a:r>
+              <a:rPr lang="en-US" u="sng" dirty="0"/>
+              <a:t>Fine grained client-specific interfaces</a:t>
+            </a:r>
+            <a:endParaRPr lang="lt-LT" u="sng" dirty="0"/>
+          </a:p>
+        </p:txBody>
+      </p:sp>
+      <p:pic>
+        <p:nvPicPr>
+          <p:cNvPr id="5" name="Paveikslėlis 4">
+            <a:extLst>
+              <a:ext uri="{FF2B5EF4-FFF2-40B4-BE49-F238E27FC236}">
+                <a16:creationId xmlns:a16="http://schemas.microsoft.com/office/drawing/2014/main" id="{21030A4F-DF7F-453B-7F78-C9CEF4B2E1AF}"/>
+              </a:ext>
+            </a:extLst>
+          </p:cNvPr>
+          <p:cNvPicPr>
+            <a:picLocks noChangeAspect="1"/>
+          </p:cNvPicPr>
+          <p:nvPr/>
+        </p:nvPicPr>
+        <p:blipFill>
+          <a:blip r:embed="rId2"/>
+          <a:stretch>
+            <a:fillRect/>
+          </a:stretch>
+        </p:blipFill>
+        <p:spPr>
+          <a:xfrm>
+            <a:off x="7228114" y="1145189"/>
+            <a:ext cx="4604657" cy="4567622"/>
+          </a:xfrm>
+          <a:prstGeom prst="rect">
+            <a:avLst/>
+          </a:prstGeom>
+        </p:spPr>
+      </p:pic>
+      <p:sp>
+        <p:nvSpPr>
+          <p:cNvPr id="6" name="TextBox 5">
+            <a:extLst>
+              <a:ext uri="{FF2B5EF4-FFF2-40B4-BE49-F238E27FC236}">
+                <a16:creationId xmlns:a16="http://schemas.microsoft.com/office/drawing/2014/main" id="{A246F5E6-3581-FE21-C5E6-2C42B3886473}"/>
+              </a:ext>
+            </a:extLst>
+          </p:cNvPr>
+          <p:cNvSpPr txBox="1"/>
+          <p:nvPr/>
+        </p:nvSpPr>
+        <p:spPr>
+          <a:xfrm>
+            <a:off x="7522132" y="5992297"/>
+            <a:ext cx="4669868" cy="369332"/>
+          </a:xfrm>
+          <a:prstGeom prst="rect">
+            <a:avLst/>
+          </a:prstGeom>
+          <a:noFill/>
+        </p:spPr>
+        <p:txBody>
+          <a:bodyPr wrap="none" rtlCol="0">
+            <a:spAutoFit/>
+          </a:bodyPr>
+          <a:lstStyle/>
+          <a:p>
+            <a:r>
+              <a:rPr lang="en-US" dirty="0"/>
+              <a:t>There is no combined power &amp; water connector</a:t>
+            </a:r>
             <a:endParaRPr lang="lt-LT" dirty="0"/>
           </a:p>
         </p:txBody>
@@ -4685,7 +5615,174 @@
     </p:spTree>
     <p:extLst>
       <p:ext uri="{BB962C8B-B14F-4D97-AF65-F5344CB8AC3E}">
-        <p14:creationId xmlns:p14="http://schemas.microsoft.com/office/powerpoint/2010/main" val="1599169087"/>
+        <p14:creationId xmlns:p14="http://schemas.microsoft.com/office/powerpoint/2010/main" val="2006682548"/>
+      </p:ext>
+    </p:extLst>
+  </p:cSld>
+  <p:clrMapOvr>
+    <a:masterClrMapping/>
+  </p:clrMapOvr>
+</p:sld>
+</file>
+
+<file path=ppt/slides/slide19.xml><?xml version="1.0" encoding="utf-8"?>
+<p:sld xmlns:a="http://schemas.openxmlformats.org/drawingml/2006/main" xmlns:r="http://schemas.openxmlformats.org/officeDocument/2006/relationships" xmlns:p="http://schemas.openxmlformats.org/presentationml/2006/main">
+  <p:cSld>
+    <p:spTree>
+      <p:nvGrpSpPr>
+        <p:cNvPr id="1" name=""/>
+        <p:cNvGrpSpPr/>
+        <p:nvPr/>
+      </p:nvGrpSpPr>
+      <p:grpSpPr>
+        <a:xfrm>
+          <a:off x="0" y="0"/>
+          <a:ext cx="0" cy="0"/>
+          <a:chOff x="0" y="0"/>
+          <a:chExt cx="0" cy="0"/>
+        </a:xfrm>
+      </p:grpSpPr>
+      <p:sp>
+        <p:nvSpPr>
+          <p:cNvPr id="2" name="Pavadinimas 1">
+            <a:extLst>
+              <a:ext uri="{FF2B5EF4-FFF2-40B4-BE49-F238E27FC236}">
+                <a16:creationId xmlns:a16="http://schemas.microsoft.com/office/drawing/2014/main" id="{184075CD-AF81-0D83-AF05-6D10D6319443}"/>
+              </a:ext>
+            </a:extLst>
+          </p:cNvPr>
+          <p:cNvSpPr>
+            <a:spLocks noGrp="1"/>
+          </p:cNvSpPr>
+          <p:nvPr>
+            <p:ph type="title"/>
+          </p:nvPr>
+        </p:nvSpPr>
+        <p:spPr>
+          <a:xfrm>
+            <a:off x="286839" y="167957"/>
+            <a:ext cx="10515600" cy="1325563"/>
+          </a:xfrm>
+        </p:spPr>
+        <p:txBody>
+          <a:bodyPr/>
+          <a:lstStyle/>
+          <a:p>
+            <a:r>
+              <a:rPr lang="en-US" dirty="0"/>
+              <a:t>Dependency Inversion principle</a:t>
+            </a:r>
+            <a:endParaRPr lang="lt-LT" dirty="0"/>
+          </a:p>
+        </p:txBody>
+      </p:sp>
+      <p:sp>
+        <p:nvSpPr>
+          <p:cNvPr id="3" name="Turinio vietos rezervavimo ženklas 2">
+            <a:extLst>
+              <a:ext uri="{FF2B5EF4-FFF2-40B4-BE49-F238E27FC236}">
+                <a16:creationId xmlns:a16="http://schemas.microsoft.com/office/drawing/2014/main" id="{7550D0C1-729E-A6DF-92AB-3579773EBB29}"/>
+              </a:ext>
+            </a:extLst>
+          </p:cNvPr>
+          <p:cNvSpPr>
+            <a:spLocks noGrp="1"/>
+          </p:cNvSpPr>
+          <p:nvPr>
+            <p:ph idx="1"/>
+          </p:nvPr>
+        </p:nvSpPr>
+        <p:spPr>
+          <a:xfrm>
+            <a:off x="519590" y="2664823"/>
+            <a:ext cx="4822371" cy="3520049"/>
+          </a:xfrm>
+        </p:spPr>
+        <p:txBody>
+          <a:bodyPr/>
+          <a:lstStyle/>
+          <a:p>
+            <a:pPr marL="0" indent="0">
+              <a:buNone/>
+            </a:pPr>
+            <a:r>
+              <a:rPr lang="en-US" u="sng" dirty="0"/>
+              <a:t>Depend on abstractions, not concrete implementations.</a:t>
+            </a:r>
+            <a:endParaRPr lang="lt-LT" u="sng" dirty="0"/>
+          </a:p>
+        </p:txBody>
+      </p:sp>
+      <p:pic>
+        <p:nvPicPr>
+          <p:cNvPr id="5" name="Paveikslėlis 4">
+            <a:extLst>
+              <a:ext uri="{FF2B5EF4-FFF2-40B4-BE49-F238E27FC236}">
+                <a16:creationId xmlns:a16="http://schemas.microsoft.com/office/drawing/2014/main" id="{58A4B17D-A496-E6D6-59C3-E05EB63321EB}"/>
+              </a:ext>
+            </a:extLst>
+          </p:cNvPr>
+          <p:cNvPicPr>
+            <a:picLocks noChangeAspect="1"/>
+          </p:cNvPicPr>
+          <p:nvPr/>
+        </p:nvPicPr>
+        <p:blipFill>
+          <a:blip r:embed="rId2"/>
+          <a:stretch>
+            <a:fillRect/>
+          </a:stretch>
+        </p:blipFill>
+        <p:spPr>
+          <a:xfrm>
+            <a:off x="5544639" y="1687467"/>
+            <a:ext cx="6598580" cy="4118791"/>
+          </a:xfrm>
+          <a:prstGeom prst="rect">
+            <a:avLst/>
+          </a:prstGeom>
+        </p:spPr>
+      </p:pic>
+      <p:sp>
+        <p:nvSpPr>
+          <p:cNvPr id="6" name="TextBox 5">
+            <a:extLst>
+              <a:ext uri="{FF2B5EF4-FFF2-40B4-BE49-F238E27FC236}">
+                <a16:creationId xmlns:a16="http://schemas.microsoft.com/office/drawing/2014/main" id="{CC0444F3-6571-5819-6DF8-B64A37C5D011}"/>
+              </a:ext>
+            </a:extLst>
+          </p:cNvPr>
+          <p:cNvSpPr txBox="1"/>
+          <p:nvPr/>
+        </p:nvSpPr>
+        <p:spPr>
+          <a:xfrm>
+            <a:off x="6783977" y="6000206"/>
+            <a:ext cx="4794711" cy="369332"/>
+          </a:xfrm>
+          <a:prstGeom prst="rect">
+            <a:avLst/>
+          </a:prstGeom>
+          <a:noFill/>
+        </p:spPr>
+        <p:txBody>
+          <a:bodyPr wrap="none" rtlCol="0">
+            <a:spAutoFit/>
+          </a:bodyPr>
+          <a:lstStyle/>
+          <a:p>
+            <a:r>
+              <a:rPr lang="en-US" dirty="0"/>
+              <a:t>Excavator design doesn’t depend on attachments</a:t>
+            </a:r>
+            <a:endParaRPr lang="lt-LT" dirty="0"/>
+          </a:p>
+        </p:txBody>
+      </p:sp>
+    </p:spTree>
+    <p:extLst>
+      <p:ext uri="{BB962C8B-B14F-4D97-AF65-F5344CB8AC3E}">
+        <p14:creationId xmlns:p14="http://schemas.microsoft.com/office/powerpoint/2010/main" val="2656473725"/>
       </p:ext>
     </p:extLst>
   </p:cSld>
@@ -4806,6 +5903,337 @@
     <p:extLst>
       <p:ext uri="{BB962C8B-B14F-4D97-AF65-F5344CB8AC3E}">
         <p14:creationId xmlns:p14="http://schemas.microsoft.com/office/powerpoint/2010/main" val="822710137"/>
+      </p:ext>
+    </p:extLst>
+  </p:cSld>
+  <p:clrMapOvr>
+    <a:masterClrMapping/>
+  </p:clrMapOvr>
+</p:sld>
+</file>
+
+<file path=ppt/slides/slide20.xml><?xml version="1.0" encoding="utf-8"?>
+<p:sld xmlns:a="http://schemas.openxmlformats.org/drawingml/2006/main" xmlns:r="http://schemas.openxmlformats.org/officeDocument/2006/relationships" xmlns:p="http://schemas.openxmlformats.org/presentationml/2006/main">
+  <p:cSld>
+    <p:spTree>
+      <p:nvGrpSpPr>
+        <p:cNvPr id="1" name=""/>
+        <p:cNvGrpSpPr/>
+        <p:nvPr/>
+      </p:nvGrpSpPr>
+      <p:grpSpPr>
+        <a:xfrm>
+          <a:off x="0" y="0"/>
+          <a:ext cx="0" cy="0"/>
+          <a:chOff x="0" y="0"/>
+          <a:chExt cx="0" cy="0"/>
+        </a:xfrm>
+      </p:grpSpPr>
+      <p:sp>
+        <p:nvSpPr>
+          <p:cNvPr id="2" name="Pavadinimas 1">
+            <a:extLst>
+              <a:ext uri="{FF2B5EF4-FFF2-40B4-BE49-F238E27FC236}">
+                <a16:creationId xmlns:a16="http://schemas.microsoft.com/office/drawing/2014/main" id="{64C9A963-817A-8085-CDC7-E9BA88DD5D02}"/>
+              </a:ext>
+            </a:extLst>
+          </p:cNvPr>
+          <p:cNvSpPr>
+            <a:spLocks noGrp="1"/>
+          </p:cNvSpPr>
+          <p:nvPr>
+            <p:ph type="title"/>
+          </p:nvPr>
+        </p:nvSpPr>
+        <p:spPr/>
+        <p:txBody>
+          <a:bodyPr/>
+          <a:lstStyle/>
+          <a:p>
+            <a:r>
+              <a:rPr lang="en-US" dirty="0"/>
+              <a:t>Tips to make your code SOLID!</a:t>
+            </a:r>
+            <a:endParaRPr lang="lt-LT" dirty="0"/>
+          </a:p>
+        </p:txBody>
+      </p:sp>
+      <p:sp>
+        <p:nvSpPr>
+          <p:cNvPr id="3" name="Turinio vietos rezervavimo ženklas 2">
+            <a:extLst>
+              <a:ext uri="{FF2B5EF4-FFF2-40B4-BE49-F238E27FC236}">
+                <a16:creationId xmlns:a16="http://schemas.microsoft.com/office/drawing/2014/main" id="{908C165C-6DA7-80A5-7364-E23C8DEB729E}"/>
+              </a:ext>
+            </a:extLst>
+          </p:cNvPr>
+          <p:cNvSpPr>
+            <a:spLocks noGrp="1"/>
+          </p:cNvSpPr>
+          <p:nvPr>
+            <p:ph idx="1"/>
+          </p:nvPr>
+        </p:nvSpPr>
+        <p:spPr>
+          <a:xfrm>
+            <a:off x="838200" y="1825625"/>
+            <a:ext cx="10515600" cy="3744665"/>
+          </a:xfrm>
+        </p:spPr>
+        <p:txBody>
+          <a:bodyPr>
+            <a:normAutofit/>
+          </a:bodyPr>
+          <a:lstStyle/>
+          <a:p>
+            <a:r>
+              <a:rPr lang="en-US" dirty="0"/>
+              <a:t>Try to find a balance between grouping and separating code/logic</a:t>
+            </a:r>
+          </a:p>
+          <a:p>
+            <a:r>
+              <a:rPr lang="en-US" dirty="0"/>
+              <a:t>Prefer composition over inheritance</a:t>
+            </a:r>
+          </a:p>
+          <a:p>
+            <a:r>
+              <a:rPr lang="en-US" dirty="0"/>
+              <a:t>Avoid long methods, classes and interfaces</a:t>
+            </a:r>
+          </a:p>
+          <a:p>
+            <a:r>
+              <a:rPr lang="en-US" dirty="0"/>
+              <a:t>Use interfaces! Ensure they have clear reusable purpose</a:t>
+            </a:r>
+          </a:p>
+          <a:p>
+            <a:r>
+              <a:rPr lang="en-US" dirty="0"/>
+              <a:t>Think about what needs to be done to extend the code in the future</a:t>
+            </a:r>
+          </a:p>
+          <a:p>
+            <a:r>
+              <a:rPr lang="en-US" dirty="0"/>
+              <a:t>Assume that someone with less experience is reading your code</a:t>
+            </a:r>
+          </a:p>
+          <a:p>
+            <a:r>
+              <a:rPr lang="en-US" dirty="0"/>
+              <a:t>Avoid hardcoding</a:t>
+            </a:r>
+          </a:p>
+          <a:p>
+            <a:pPr marL="0" indent="0">
+              <a:buNone/>
+            </a:pPr>
+            <a:endParaRPr lang="en-US" dirty="0"/>
+          </a:p>
+          <a:p>
+            <a:endParaRPr lang="en-US" dirty="0"/>
+          </a:p>
+          <a:p>
+            <a:endParaRPr lang="lt-LT" dirty="0"/>
+          </a:p>
+        </p:txBody>
+      </p:sp>
+    </p:spTree>
+    <p:extLst>
+      <p:ext uri="{BB962C8B-B14F-4D97-AF65-F5344CB8AC3E}">
+        <p14:creationId xmlns:p14="http://schemas.microsoft.com/office/powerpoint/2010/main" val="1529863891"/>
+      </p:ext>
+    </p:extLst>
+  </p:cSld>
+  <p:clrMapOvr>
+    <a:masterClrMapping/>
+  </p:clrMapOvr>
+</p:sld>
+</file>
+
+<file path=ppt/slides/slide21.xml><?xml version="1.0" encoding="utf-8"?>
+<p:sld xmlns:a="http://schemas.openxmlformats.org/drawingml/2006/main" xmlns:r="http://schemas.openxmlformats.org/officeDocument/2006/relationships" xmlns:p="http://schemas.openxmlformats.org/presentationml/2006/main">
+  <p:cSld>
+    <p:spTree>
+      <p:nvGrpSpPr>
+        <p:cNvPr id="1" name=""/>
+        <p:cNvGrpSpPr/>
+        <p:nvPr/>
+      </p:nvGrpSpPr>
+      <p:grpSpPr>
+        <a:xfrm>
+          <a:off x="0" y="0"/>
+          <a:ext cx="0" cy="0"/>
+          <a:chOff x="0" y="0"/>
+          <a:chExt cx="0" cy="0"/>
+        </a:xfrm>
+      </p:grpSpPr>
+      <p:sp>
+        <p:nvSpPr>
+          <p:cNvPr id="2" name="Pavadinimas 1">
+            <a:extLst>
+              <a:ext uri="{FF2B5EF4-FFF2-40B4-BE49-F238E27FC236}">
+                <a16:creationId xmlns:a16="http://schemas.microsoft.com/office/drawing/2014/main" id="{184075CD-AF81-0D83-AF05-6D10D6319443}"/>
+              </a:ext>
+            </a:extLst>
+          </p:cNvPr>
+          <p:cNvSpPr>
+            <a:spLocks noGrp="1"/>
+          </p:cNvSpPr>
+          <p:nvPr>
+            <p:ph type="title"/>
+          </p:nvPr>
+        </p:nvSpPr>
+        <p:spPr/>
+        <p:txBody>
+          <a:bodyPr/>
+          <a:lstStyle/>
+          <a:p>
+            <a:pPr algn="ctr"/>
+            <a:r>
+              <a:rPr lang="en-US" dirty="0"/>
+              <a:t>Workshop time!</a:t>
+            </a:r>
+            <a:endParaRPr lang="lt-LT" dirty="0"/>
+          </a:p>
+        </p:txBody>
+      </p:sp>
+      <p:pic>
+        <p:nvPicPr>
+          <p:cNvPr id="5" name="Paveikslėlis 4">
+            <a:extLst>
+              <a:ext uri="{FF2B5EF4-FFF2-40B4-BE49-F238E27FC236}">
+                <a16:creationId xmlns:a16="http://schemas.microsoft.com/office/drawing/2014/main" id="{CBFBD389-2B23-8630-8064-84A7A2193B82}"/>
+              </a:ext>
+            </a:extLst>
+          </p:cNvPr>
+          <p:cNvPicPr>
+            <a:picLocks noChangeAspect="1"/>
+          </p:cNvPicPr>
+          <p:nvPr/>
+        </p:nvPicPr>
+        <p:blipFill>
+          <a:blip r:embed="rId2">
+            <a:extLst>
+              <a:ext uri="{28A0092B-C50C-407E-A947-70E740481C1C}">
+                <a14:useLocalDpi xmlns:a14="http://schemas.microsoft.com/office/drawing/2010/main" val="0"/>
+              </a:ext>
+            </a:extLst>
+          </a:blip>
+          <a:stretch>
+            <a:fillRect/>
+          </a:stretch>
+        </p:blipFill>
+        <p:spPr>
+          <a:xfrm>
+            <a:off x="1694362" y="1604791"/>
+            <a:ext cx="8803276" cy="4736545"/>
+          </a:xfrm>
+          <a:prstGeom prst="rect">
+            <a:avLst/>
+          </a:prstGeom>
+        </p:spPr>
+      </p:pic>
+    </p:spTree>
+    <p:extLst>
+      <p:ext uri="{BB962C8B-B14F-4D97-AF65-F5344CB8AC3E}">
+        <p14:creationId xmlns:p14="http://schemas.microsoft.com/office/powerpoint/2010/main" val="2211100357"/>
+      </p:ext>
+    </p:extLst>
+  </p:cSld>
+  <p:clrMapOvr>
+    <a:masterClrMapping/>
+  </p:clrMapOvr>
+</p:sld>
+</file>
+
+<file path=ppt/slides/slide22.xml><?xml version="1.0" encoding="utf-8"?>
+<p:sld xmlns:a="http://schemas.openxmlformats.org/drawingml/2006/main" xmlns:r="http://schemas.openxmlformats.org/officeDocument/2006/relationships" xmlns:p="http://schemas.openxmlformats.org/presentationml/2006/main">
+  <p:cSld>
+    <p:spTree>
+      <p:nvGrpSpPr>
+        <p:cNvPr id="1" name=""/>
+        <p:cNvGrpSpPr/>
+        <p:nvPr/>
+      </p:nvGrpSpPr>
+      <p:grpSpPr>
+        <a:xfrm>
+          <a:off x="0" y="0"/>
+          <a:ext cx="0" cy="0"/>
+          <a:chOff x="0" y="0"/>
+          <a:chExt cx="0" cy="0"/>
+        </a:xfrm>
+      </p:grpSpPr>
+      <p:sp>
+        <p:nvSpPr>
+          <p:cNvPr id="2" name="Pavadinimas 1">
+            <a:extLst>
+              <a:ext uri="{FF2B5EF4-FFF2-40B4-BE49-F238E27FC236}">
+                <a16:creationId xmlns:a16="http://schemas.microsoft.com/office/drawing/2014/main" id="{D644839F-31A3-14B9-F092-724C03D64C4B}"/>
+              </a:ext>
+            </a:extLst>
+          </p:cNvPr>
+          <p:cNvSpPr>
+            <a:spLocks noGrp="1"/>
+          </p:cNvSpPr>
+          <p:nvPr>
+            <p:ph type="title"/>
+          </p:nvPr>
+        </p:nvSpPr>
+        <p:spPr/>
+        <p:txBody>
+          <a:bodyPr/>
+          <a:lstStyle/>
+          <a:p>
+            <a:r>
+              <a:rPr lang="en-US" dirty="0"/>
+              <a:t>Useful links</a:t>
+            </a:r>
+            <a:endParaRPr lang="lt-LT" dirty="0"/>
+          </a:p>
+        </p:txBody>
+      </p:sp>
+      <p:sp>
+        <p:nvSpPr>
+          <p:cNvPr id="3" name="Turinio vietos rezervavimo ženklas 2">
+            <a:extLst>
+              <a:ext uri="{FF2B5EF4-FFF2-40B4-BE49-F238E27FC236}">
+                <a16:creationId xmlns:a16="http://schemas.microsoft.com/office/drawing/2014/main" id="{E45A490F-C277-746C-3912-F62AC00E589B}"/>
+              </a:ext>
+            </a:extLst>
+          </p:cNvPr>
+          <p:cNvSpPr>
+            <a:spLocks noGrp="1"/>
+          </p:cNvSpPr>
+          <p:nvPr>
+            <p:ph idx="1"/>
+          </p:nvPr>
+        </p:nvSpPr>
+        <p:spPr/>
+        <p:txBody>
+          <a:bodyPr/>
+          <a:lstStyle/>
+          <a:p>
+            <a:r>
+              <a:rPr lang="en-US" dirty="0">
+                <a:hlinkClick r:id="rId2"/>
+              </a:rPr>
+              <a:t>https://github.com/Almantask/CSharp-From-Zero-To-Hero/</a:t>
+            </a:r>
+            <a:endParaRPr lang="en-US" dirty="0"/>
+          </a:p>
+          <a:p>
+            <a:endParaRPr lang="lt-LT" dirty="0"/>
+          </a:p>
+        </p:txBody>
+      </p:sp>
+    </p:spTree>
+    <p:extLst>
+      <p:ext uri="{BB962C8B-B14F-4D97-AF65-F5344CB8AC3E}">
+        <p14:creationId xmlns:p14="http://schemas.microsoft.com/office/powerpoint/2010/main" val="1599169087"/>
       </p:ext>
     </p:extLst>
   </p:cSld>
@@ -5049,7 +6477,7 @@
         </p:nvSpPr>
         <p:spPr>
           <a:xfrm>
-            <a:off x="124097" y="2309812"/>
+            <a:off x="838200" y="2348237"/>
             <a:ext cx="10515600" cy="4351338"/>
           </a:xfrm>
         </p:spPr>
@@ -5151,7 +6579,7 @@
         </p:blipFill>
         <p:spPr>
           <a:xfrm>
-            <a:off x="7193280" y="158425"/>
+            <a:off x="7053943" y="410095"/>
             <a:ext cx="4770120" cy="4509762"/>
           </a:xfrm>
           <a:prstGeom prst="rect">

</xml_diff>

<commit_message>
Add Interface Segregation principle.
</commit_message>
<xml_diff>
--- a/SOLID.pptx
+++ b/SOLID.pptx
@@ -23,10 +23,13 @@
     <p:sldId id="279" r:id="rId17"/>
     <p:sldId id="280" r:id="rId18"/>
     <p:sldId id="263" r:id="rId19"/>
-    <p:sldId id="264" r:id="rId20"/>
-    <p:sldId id="277" r:id="rId21"/>
-    <p:sldId id="273" r:id="rId22"/>
-    <p:sldId id="259" r:id="rId23"/>
+    <p:sldId id="281" r:id="rId20"/>
+    <p:sldId id="283" r:id="rId21"/>
+    <p:sldId id="282" r:id="rId22"/>
+    <p:sldId id="264" r:id="rId23"/>
+    <p:sldId id="277" r:id="rId24"/>
+    <p:sldId id="273" r:id="rId25"/>
+    <p:sldId id="259" r:id="rId26"/>
   </p:sldIdLst>
   <p:sldSz cx="12192000" cy="6858000"/>
   <p:notesSz cx="6858000" cy="9144000"/>
@@ -5327,7 +5330,7 @@
             </a:pPr>
             <a:r>
               <a:rPr lang="en-US" dirty="0"/>
-              <a:t>Parent and Child classes are not interchangeable.</a:t>
+              <a:t>Parent and Child classes are not always interchangeable.</a:t>
             </a:r>
           </a:p>
           <a:p>
@@ -5393,7 +5396,7 @@
             </a:pPr>
             <a:r>
               <a:rPr lang="en-US" dirty="0"/>
-              <a:t>Parent and Child classes are interchangeable.</a:t>
+              <a:t>Parent and Child classes are always interchangeable.</a:t>
             </a:r>
           </a:p>
           <a:p>
@@ -5527,22 +5530,59 @@
         </p:nvSpPr>
         <p:spPr>
           <a:xfrm>
-            <a:off x="838199" y="3135085"/>
+            <a:off x="576943" y="2401754"/>
             <a:ext cx="5519057" cy="3041877"/>
           </a:xfrm>
         </p:spPr>
         <p:txBody>
-          <a:bodyPr/>
-          <a:lstStyle/>
+          <a:bodyPr>
+            <a:normAutofit fontScale="92500"/>
+          </a:bodyPr>
+          <a:lstStyle/>
+          <a:p>
+            <a:pPr marL="0" indent="0" algn="ctr">
+              <a:buNone/>
+            </a:pPr>
+            <a:r>
+              <a:rPr lang="en-US" u="sng" dirty="0"/>
+              <a:t>Fine-grained client-specific interfaces.</a:t>
+            </a:r>
+          </a:p>
+          <a:p>
+            <a:pPr marL="0" indent="0" algn="ctr">
+              <a:buNone/>
+            </a:pPr>
+            <a:endParaRPr lang="en-US" dirty="0"/>
+          </a:p>
+          <a:p>
+            <a:pPr marL="0" indent="0" algn="ctr">
+              <a:buNone/>
+            </a:pPr>
+            <a:r>
+              <a:rPr lang="en-US" dirty="0"/>
+              <a:t>or</a:t>
+            </a:r>
+          </a:p>
+          <a:p>
+            <a:pPr marL="0" indent="0" algn="ctr">
+              <a:buNone/>
+            </a:pPr>
+            <a:endParaRPr lang="en-US" dirty="0"/>
+          </a:p>
+          <a:p>
+            <a:pPr marL="0" indent="0" algn="ctr">
+              <a:buNone/>
+            </a:pPr>
+            <a:r>
+              <a:rPr lang="en-US" u="sng" dirty="0"/>
+              <a:t>Clients should not be forced to depend on interfaces they don't use. </a:t>
+            </a:r>
+          </a:p>
           <a:p>
             <a:pPr marL="0" indent="0">
               <a:buNone/>
             </a:pPr>
-            <a:r>
-              <a:rPr lang="en-US" u="sng" dirty="0"/>
-              <a:t>Fine grained client-specific interfaces</a:t>
-            </a:r>
-            <a:endParaRPr lang="lt-LT" u="sng" dirty="0"/>
+            <a:endParaRPr lang="lt-LT" dirty="0"/>
           </a:p>
         </p:txBody>
       </p:sp>
@@ -5647,7 +5687,7 @@
           <p:cNvPr id="2" name="Pavadinimas 1">
             <a:extLst>
               <a:ext uri="{FF2B5EF4-FFF2-40B4-BE49-F238E27FC236}">
-                <a16:creationId xmlns:a16="http://schemas.microsoft.com/office/drawing/2014/main" id="{184075CD-AF81-0D83-AF05-6D10D6319443}"/>
+                <a16:creationId xmlns:a16="http://schemas.microsoft.com/office/drawing/2014/main" id="{A7C94AAB-7BC4-240D-B73F-654CF0A9B5FE}"/>
               </a:ext>
             </a:extLst>
           </p:cNvPr>
@@ -5658,19 +5698,14 @@
             <p:ph type="title"/>
           </p:nvPr>
         </p:nvSpPr>
-        <p:spPr>
-          <a:xfrm>
-            <a:off x="286839" y="167957"/>
-            <a:ext cx="10515600" cy="1325563"/>
-          </a:xfrm>
-        </p:spPr>
+        <p:spPr/>
         <p:txBody>
           <a:bodyPr/>
           <a:lstStyle/>
           <a:p>
             <a:r>
               <a:rPr lang="en-US" dirty="0"/>
-              <a:t>Dependency Inversion principle</a:t>
+              <a:t>Interface Segregation principle</a:t>
             </a:r>
             <a:endParaRPr lang="lt-LT" dirty="0"/>
           </a:p>
@@ -5681,7 +5716,7 @@
           <p:cNvPr id="3" name="Turinio vietos rezervavimo ženklas 2">
             <a:extLst>
               <a:ext uri="{FF2B5EF4-FFF2-40B4-BE49-F238E27FC236}">
-                <a16:creationId xmlns:a16="http://schemas.microsoft.com/office/drawing/2014/main" id="{7550D0C1-729E-A6DF-92AB-3579773EBB29}"/>
+                <a16:creationId xmlns:a16="http://schemas.microsoft.com/office/drawing/2014/main" id="{D434C668-0D16-5E5E-32A2-EFF7D59BE538}"/>
               </a:ext>
             </a:extLst>
           </p:cNvPr>
@@ -5694,31 +5729,127 @@
         </p:nvSpPr>
         <p:spPr>
           <a:xfrm>
-            <a:off x="519590" y="2664823"/>
-            <a:ext cx="4822371" cy="3520049"/>
+            <a:off x="533400" y="1952375"/>
+            <a:ext cx="4874537" cy="4351338"/>
           </a:xfrm>
         </p:spPr>
         <p:txBody>
           <a:bodyPr/>
           <a:lstStyle/>
           <a:p>
-            <a:pPr marL="0" indent="0">
-              <a:buNone/>
+            <a:r>
+              <a:rPr lang="en-US" dirty="0"/>
+              <a:t>Avoid interface pollution</a:t>
+            </a:r>
+          </a:p>
+          <a:p>
+            <a:r>
+              <a:rPr lang="en-US" dirty="0"/>
+              <a:t>A single interface for everything is too vague and different implementations or clients might not use all that it provides</a:t>
+            </a:r>
+          </a:p>
+          <a:p>
+            <a:endParaRPr lang="en-US" dirty="0"/>
+          </a:p>
+          <a:p>
+            <a:endParaRPr lang="lt-LT" dirty="0"/>
+          </a:p>
+        </p:txBody>
+      </p:sp>
+      <p:sp>
+        <p:nvSpPr>
+          <p:cNvPr id="4" name="TextBox 3">
+            <a:extLst>
+              <a:ext uri="{FF2B5EF4-FFF2-40B4-BE49-F238E27FC236}">
+                <a16:creationId xmlns:a16="http://schemas.microsoft.com/office/drawing/2014/main" id="{670F2EB5-2366-FCE4-5039-5C773E93463A}"/>
+              </a:ext>
+            </a:extLst>
+          </p:cNvPr>
+          <p:cNvSpPr txBox="1"/>
+          <p:nvPr/>
+        </p:nvSpPr>
+        <p:spPr>
+          <a:xfrm>
+            <a:off x="5935607" y="4698749"/>
+            <a:ext cx="6256393" cy="1200329"/>
+          </a:xfrm>
+          <a:prstGeom prst="rect">
+            <a:avLst/>
+          </a:prstGeom>
+          <a:noFill/>
+        </p:spPr>
+        <p:txBody>
+          <a:bodyPr wrap="none" rtlCol="0">
+            <a:spAutoFit/>
+          </a:bodyPr>
+          <a:lstStyle/>
+          <a:p>
+            <a:pPr rtl="0" fontAlgn="base">
+              <a:spcBef>
+                <a:spcPts val="0"/>
+              </a:spcBef>
+              <a:spcAft>
+                <a:spcPts val="0"/>
+              </a:spcAft>
+              <a:buFont typeface="Arial" panose="020B0604020202020204" pitchFamily="34" charset="0"/>
+              <a:buChar char="•"/>
             </a:pPr>
             <a:r>
-              <a:rPr lang="en-US" u="sng" dirty="0"/>
-              <a:t>Depend on abstractions, not concrete implementations.</a:t>
-            </a:r>
-            <a:endParaRPr lang="lt-LT" u="sng" dirty="0"/>
+              <a:rPr lang="en-US" dirty="0"/>
+              <a:t>How many unrelated responsibilities exist in this interface?</a:t>
+            </a:r>
+          </a:p>
+          <a:p>
+            <a:pPr rtl="0" fontAlgn="base">
+              <a:spcBef>
+                <a:spcPts val="0"/>
+              </a:spcBef>
+              <a:spcAft>
+                <a:spcPts val="0"/>
+              </a:spcAft>
+              <a:buFont typeface="Arial" panose="020B0604020202020204" pitchFamily="34" charset="0"/>
+              <a:buChar char="•"/>
+            </a:pPr>
+            <a:r>
+              <a:rPr lang="en-US" dirty="0"/>
+              <a:t>What can we expect from the </a:t>
+            </a:r>
+            <a:r>
+              <a:rPr lang="en-US" dirty="0" err="1"/>
+              <a:t>IVehicle</a:t>
+            </a:r>
+            <a:r>
+              <a:rPr lang="en-US" dirty="0"/>
+              <a:t>?</a:t>
+            </a:r>
+          </a:p>
+          <a:p>
+            <a:pPr rtl="0" fontAlgn="base">
+              <a:spcBef>
+                <a:spcPts val="0"/>
+              </a:spcBef>
+              <a:spcAft>
+                <a:spcPts val="0"/>
+              </a:spcAft>
+              <a:buFont typeface="Arial" panose="020B0604020202020204" pitchFamily="34" charset="0"/>
+              <a:buChar char="•"/>
+            </a:pPr>
+            <a:r>
+              <a:rPr lang="en-US" dirty="0"/>
+              <a:t>What happens to the consumer when new methods are added?</a:t>
+            </a:r>
+          </a:p>
+          <a:p>
+            <a:endParaRPr lang="lt-LT" dirty="0"/>
           </a:p>
         </p:txBody>
       </p:sp>
       <p:pic>
         <p:nvPicPr>
-          <p:cNvPr id="5" name="Paveikslėlis 4">
-            <a:extLst>
-              <a:ext uri="{FF2B5EF4-FFF2-40B4-BE49-F238E27FC236}">
-                <a16:creationId xmlns:a16="http://schemas.microsoft.com/office/drawing/2014/main" id="{58A4B17D-A496-E6D6-59C3-E05EB63321EB}"/>
+          <p:cNvPr id="7" name="Paveikslėlis 6">
+            <a:extLst>
+              <a:ext uri="{FF2B5EF4-FFF2-40B4-BE49-F238E27FC236}">
+                <a16:creationId xmlns:a16="http://schemas.microsoft.com/office/drawing/2014/main" id="{9FB4D84F-EFB9-781D-29FC-3BF059C8CCC8}"/>
               </a:ext>
             </a:extLst>
           </p:cNvPr>
@@ -5735,54 +5866,18 @@
         </p:blipFill>
         <p:spPr>
           <a:xfrm>
-            <a:off x="5544639" y="1687467"/>
-            <a:ext cx="6598580" cy="4118791"/>
+            <a:off x="6919867" y="2130825"/>
+            <a:ext cx="2443819" cy="2205785"/>
           </a:xfrm>
           <a:prstGeom prst="rect">
             <a:avLst/>
           </a:prstGeom>
         </p:spPr>
       </p:pic>
-      <p:sp>
-        <p:nvSpPr>
-          <p:cNvPr id="6" name="TextBox 5">
-            <a:extLst>
-              <a:ext uri="{FF2B5EF4-FFF2-40B4-BE49-F238E27FC236}">
-                <a16:creationId xmlns:a16="http://schemas.microsoft.com/office/drawing/2014/main" id="{CC0444F3-6571-5819-6DF8-B64A37C5D011}"/>
-              </a:ext>
-            </a:extLst>
-          </p:cNvPr>
-          <p:cNvSpPr txBox="1"/>
-          <p:nvPr/>
-        </p:nvSpPr>
-        <p:spPr>
-          <a:xfrm>
-            <a:off x="6783977" y="6000206"/>
-            <a:ext cx="4794711" cy="369332"/>
-          </a:xfrm>
-          <a:prstGeom prst="rect">
-            <a:avLst/>
-          </a:prstGeom>
-          <a:noFill/>
-        </p:spPr>
-        <p:txBody>
-          <a:bodyPr wrap="none" rtlCol="0">
-            <a:spAutoFit/>
-          </a:bodyPr>
-          <a:lstStyle/>
-          <a:p>
-            <a:r>
-              <a:rPr lang="en-US" dirty="0"/>
-              <a:t>Excavator design doesn’t depend on attachments</a:t>
-            </a:r>
-            <a:endParaRPr lang="lt-LT" dirty="0"/>
-          </a:p>
-        </p:txBody>
-      </p:sp>
     </p:spTree>
     <p:extLst>
       <p:ext uri="{BB962C8B-B14F-4D97-AF65-F5344CB8AC3E}">
-        <p14:creationId xmlns:p14="http://schemas.microsoft.com/office/powerpoint/2010/main" val="2656473725"/>
+        <p14:creationId xmlns:p14="http://schemas.microsoft.com/office/powerpoint/2010/main" val="1977184829"/>
       </p:ext>
     </p:extLst>
   </p:cSld>
@@ -5934,7 +6029,7 @@
           <p:cNvPr id="2" name="Pavadinimas 1">
             <a:extLst>
               <a:ext uri="{FF2B5EF4-FFF2-40B4-BE49-F238E27FC236}">
-                <a16:creationId xmlns:a16="http://schemas.microsoft.com/office/drawing/2014/main" id="{64C9A963-817A-8085-CDC7-E9BA88DD5D02}"/>
+                <a16:creationId xmlns:a16="http://schemas.microsoft.com/office/drawing/2014/main" id="{5FF3D6EC-C7A3-6BA8-DF52-CA09D9281B1D}"/>
               </a:ext>
             </a:extLst>
           </p:cNvPr>
@@ -5952,99 +6047,76 @@
           <a:p>
             <a:r>
               <a:rPr lang="en-US" dirty="0"/>
-              <a:t>Tips to make your code SOLID!</a:t>
+              <a:t>Interface Segregation principle: the problem</a:t>
             </a:r>
             <a:endParaRPr lang="lt-LT" dirty="0"/>
           </a:p>
         </p:txBody>
       </p:sp>
-      <p:sp>
-        <p:nvSpPr>
-          <p:cNvPr id="3" name="Turinio vietos rezervavimo ženklas 2">
-            <a:extLst>
-              <a:ext uri="{FF2B5EF4-FFF2-40B4-BE49-F238E27FC236}">
-                <a16:creationId xmlns:a16="http://schemas.microsoft.com/office/drawing/2014/main" id="{908C165C-6DA7-80A5-7364-E23C8DEB729E}"/>
-              </a:ext>
-            </a:extLst>
-          </p:cNvPr>
-          <p:cNvSpPr>
-            <a:spLocks noGrp="1"/>
-          </p:cNvSpPr>
-          <p:nvPr>
-            <p:ph idx="1"/>
-          </p:nvPr>
-        </p:nvSpPr>
-        <p:spPr>
-          <a:xfrm>
-            <a:off x="838200" y="1825625"/>
-            <a:ext cx="10515600" cy="3744665"/>
-          </a:xfrm>
-        </p:spPr>
-        <p:txBody>
-          <a:bodyPr>
-            <a:normAutofit/>
-          </a:bodyPr>
-          <a:lstStyle/>
-          <a:p>
-            <a:r>
-              <a:rPr lang="en-US" dirty="0"/>
-              <a:t>Try to find a balance between grouping and separating code/logic</a:t>
-            </a:r>
-          </a:p>
-          <a:p>
-            <a:r>
-              <a:rPr lang="en-US" dirty="0"/>
-              <a:t>Prefer composition over inheritance</a:t>
-            </a:r>
-          </a:p>
-          <a:p>
-            <a:r>
-              <a:rPr lang="en-US" dirty="0"/>
-              <a:t>Avoid long methods, classes and interfaces</a:t>
-            </a:r>
-          </a:p>
-          <a:p>
-            <a:r>
-              <a:rPr lang="en-US" dirty="0"/>
-              <a:t>Use interfaces! Ensure they have clear reusable purpose</a:t>
-            </a:r>
-          </a:p>
-          <a:p>
-            <a:r>
-              <a:rPr lang="en-US" dirty="0"/>
-              <a:t>Think about what needs to be done to extend the code in the future</a:t>
-            </a:r>
-          </a:p>
-          <a:p>
-            <a:r>
-              <a:rPr lang="en-US" dirty="0"/>
-              <a:t>Assume that someone with less experience is reading your code</a:t>
-            </a:r>
-          </a:p>
-          <a:p>
-            <a:r>
-              <a:rPr lang="en-US" dirty="0"/>
-              <a:t>Avoid hardcoding</a:t>
-            </a:r>
-          </a:p>
-          <a:p>
-            <a:pPr marL="0" indent="0">
-              <a:buNone/>
-            </a:pPr>
-            <a:endParaRPr lang="en-US" dirty="0"/>
-          </a:p>
-          <a:p>
-            <a:endParaRPr lang="en-US" dirty="0"/>
-          </a:p>
-          <a:p>
-            <a:endParaRPr lang="lt-LT" dirty="0"/>
-          </a:p>
-        </p:txBody>
-      </p:sp>
+      <p:pic>
+        <p:nvPicPr>
+          <p:cNvPr id="6" name="Paveikslėlis 5">
+            <a:extLst>
+              <a:ext uri="{FF2B5EF4-FFF2-40B4-BE49-F238E27FC236}">
+                <a16:creationId xmlns:a16="http://schemas.microsoft.com/office/drawing/2014/main" id="{38020D9C-F231-5011-6FE6-069D455CC93F}"/>
+              </a:ext>
+            </a:extLst>
+          </p:cNvPr>
+          <p:cNvPicPr>
+            <a:picLocks noChangeAspect="1"/>
+          </p:cNvPicPr>
+          <p:nvPr/>
+        </p:nvPicPr>
+        <p:blipFill>
+          <a:blip r:embed="rId2"/>
+          <a:stretch>
+            <a:fillRect/>
+          </a:stretch>
+        </p:blipFill>
+        <p:spPr>
+          <a:xfrm>
+            <a:off x="6614217" y="1804563"/>
+            <a:ext cx="5245823" cy="3609602"/>
+          </a:xfrm>
+          <a:prstGeom prst="rect">
+            <a:avLst/>
+          </a:prstGeom>
+        </p:spPr>
+      </p:pic>
+      <p:pic>
+        <p:nvPicPr>
+          <p:cNvPr id="8" name="Paveikslėlis 7">
+            <a:extLst>
+              <a:ext uri="{FF2B5EF4-FFF2-40B4-BE49-F238E27FC236}">
+                <a16:creationId xmlns:a16="http://schemas.microsoft.com/office/drawing/2014/main" id="{0C326A6F-2CBD-D24C-E8EE-D9E6A09CB11D}"/>
+              </a:ext>
+            </a:extLst>
+          </p:cNvPr>
+          <p:cNvPicPr>
+            <a:picLocks noChangeAspect="1"/>
+          </p:cNvPicPr>
+          <p:nvPr/>
+        </p:nvPicPr>
+        <p:blipFill>
+          <a:blip r:embed="rId3"/>
+          <a:stretch>
+            <a:fillRect/>
+          </a:stretch>
+        </p:blipFill>
+        <p:spPr>
+          <a:xfrm>
+            <a:off x="685799" y="1795037"/>
+            <a:ext cx="5742721" cy="3700415"/>
+          </a:xfrm>
+          <a:prstGeom prst="rect">
+            <a:avLst/>
+          </a:prstGeom>
+        </p:spPr>
+      </p:pic>
     </p:spTree>
     <p:extLst>
       <p:ext uri="{BB962C8B-B14F-4D97-AF65-F5344CB8AC3E}">
-        <p14:creationId xmlns:p14="http://schemas.microsoft.com/office/powerpoint/2010/main" val="1529863891"/>
+        <p14:creationId xmlns:p14="http://schemas.microsoft.com/office/powerpoint/2010/main" val="1671713118"/>
       </p:ext>
     </p:extLst>
   </p:cSld>
@@ -6076,6 +6148,518 @@
           <p:cNvPr id="2" name="Pavadinimas 1">
             <a:extLst>
               <a:ext uri="{FF2B5EF4-FFF2-40B4-BE49-F238E27FC236}">
+                <a16:creationId xmlns:a16="http://schemas.microsoft.com/office/drawing/2014/main" id="{6FADE4BB-054C-9A2E-5A10-D888FA6D8384}"/>
+              </a:ext>
+            </a:extLst>
+          </p:cNvPr>
+          <p:cNvSpPr>
+            <a:spLocks noGrp="1"/>
+          </p:cNvSpPr>
+          <p:nvPr>
+            <p:ph type="title"/>
+          </p:nvPr>
+        </p:nvSpPr>
+        <p:spPr>
+          <a:xfrm>
+            <a:off x="150137" y="156895"/>
+            <a:ext cx="10515600" cy="1325563"/>
+          </a:xfrm>
+        </p:spPr>
+        <p:txBody>
+          <a:bodyPr/>
+          <a:lstStyle/>
+          <a:p>
+            <a:r>
+              <a:rPr lang="en-US" dirty="0"/>
+              <a:t>Interface Segregation principle: the solution</a:t>
+            </a:r>
+            <a:endParaRPr lang="lt-LT" dirty="0"/>
+          </a:p>
+        </p:txBody>
+      </p:sp>
+      <p:sp>
+        <p:nvSpPr>
+          <p:cNvPr id="11" name="TextBox 10">
+            <a:extLst>
+              <a:ext uri="{FF2B5EF4-FFF2-40B4-BE49-F238E27FC236}">
+                <a16:creationId xmlns:a16="http://schemas.microsoft.com/office/drawing/2014/main" id="{7674B5E9-5BB6-7400-7DF8-6D750D100B2A}"/>
+              </a:ext>
+            </a:extLst>
+          </p:cNvPr>
+          <p:cNvSpPr txBox="1"/>
+          <p:nvPr/>
+        </p:nvSpPr>
+        <p:spPr>
+          <a:xfrm>
+            <a:off x="811040" y="1889863"/>
+            <a:ext cx="5637121" cy="2298065"/>
+          </a:xfrm>
+          <a:prstGeom prst="rect">
+            <a:avLst/>
+          </a:prstGeom>
+          <a:noFill/>
+        </p:spPr>
+        <p:txBody>
+          <a:bodyPr wrap="none" rtlCol="0">
+            <a:spAutoFit/>
+          </a:bodyPr>
+          <a:lstStyle/>
+          <a:p>
+            <a:pPr marL="285750" indent="-285750" rtl="0" fontAlgn="base">
+              <a:spcBef>
+                <a:spcPts val="0"/>
+              </a:spcBef>
+              <a:spcAft>
+                <a:spcPts val="1600"/>
+              </a:spcAft>
+              <a:buFont typeface="Arial" panose="020B0604020202020204" pitchFamily="34" charset="0"/>
+              <a:buChar char="•"/>
+            </a:pPr>
+            <a:r>
+              <a:rPr lang="en-US" dirty="0"/>
+              <a:t>Interfaces are split into logically separated parts</a:t>
+            </a:r>
+          </a:p>
+          <a:p>
+            <a:pPr marL="285750" indent="-285750" rtl="0" fontAlgn="base">
+              <a:spcBef>
+                <a:spcPts val="0"/>
+              </a:spcBef>
+              <a:spcAft>
+                <a:spcPts val="1600"/>
+              </a:spcAft>
+              <a:buFont typeface="Arial" panose="020B0604020202020204" pitchFamily="34" charset="0"/>
+              <a:buChar char="•"/>
+            </a:pPr>
+            <a:r>
+              <a:rPr lang="en-US" dirty="0"/>
+              <a:t>Clients are allowed to use only what’s needed for them</a:t>
+            </a:r>
+          </a:p>
+          <a:p>
+            <a:pPr marL="285750" indent="-285750" rtl="0" fontAlgn="base">
+              <a:spcBef>
+                <a:spcPts val="0"/>
+              </a:spcBef>
+              <a:spcAft>
+                <a:spcPts val="1600"/>
+              </a:spcAft>
+              <a:buFont typeface="Arial" panose="020B0604020202020204" pitchFamily="34" charset="0"/>
+              <a:buChar char="•"/>
+            </a:pPr>
+            <a:r>
+              <a:rPr lang="en-US" dirty="0"/>
+              <a:t>Better distinction of responsibilities</a:t>
+            </a:r>
+          </a:p>
+          <a:p>
+            <a:pPr marL="285750" indent="-285750" rtl="0" fontAlgn="base">
+              <a:spcBef>
+                <a:spcPts val="0"/>
+              </a:spcBef>
+              <a:spcAft>
+                <a:spcPts val="1600"/>
+              </a:spcAft>
+              <a:buFont typeface="Arial" panose="020B0604020202020204" pitchFamily="34" charset="0"/>
+              <a:buChar char="•"/>
+            </a:pPr>
+            <a:r>
+              <a:rPr lang="en-US" dirty="0"/>
+              <a:t>Easier to compose multiple interfaces together</a:t>
+            </a:r>
+          </a:p>
+          <a:p>
+            <a:pPr marL="285750" indent="-285750" rtl="0" fontAlgn="base">
+              <a:spcBef>
+                <a:spcPts val="0"/>
+              </a:spcBef>
+              <a:spcAft>
+                <a:spcPts val="1600"/>
+              </a:spcAft>
+              <a:buFont typeface="Arial" panose="020B0604020202020204" pitchFamily="34" charset="0"/>
+              <a:buChar char="•"/>
+            </a:pPr>
+            <a:r>
+              <a:rPr lang="en-US" dirty="0"/>
+              <a:t>Flexible object usability</a:t>
+            </a:r>
+          </a:p>
+        </p:txBody>
+      </p:sp>
+      <p:pic>
+        <p:nvPicPr>
+          <p:cNvPr id="13" name="Paveikslėlis 12">
+            <a:extLst>
+              <a:ext uri="{FF2B5EF4-FFF2-40B4-BE49-F238E27FC236}">
+                <a16:creationId xmlns:a16="http://schemas.microsoft.com/office/drawing/2014/main" id="{DB0B1AA0-FDD8-23B6-EB93-222D26B57705}"/>
+              </a:ext>
+            </a:extLst>
+          </p:cNvPr>
+          <p:cNvPicPr>
+            <a:picLocks noChangeAspect="1"/>
+          </p:cNvPicPr>
+          <p:nvPr/>
+        </p:nvPicPr>
+        <p:blipFill>
+          <a:blip r:embed="rId2"/>
+          <a:stretch>
+            <a:fillRect/>
+          </a:stretch>
+        </p:blipFill>
+        <p:spPr>
+          <a:xfrm>
+            <a:off x="7324252" y="1482457"/>
+            <a:ext cx="3713021" cy="4438049"/>
+          </a:xfrm>
+          <a:prstGeom prst="rect">
+            <a:avLst/>
+          </a:prstGeom>
+        </p:spPr>
+      </p:pic>
+    </p:spTree>
+    <p:extLst>
+      <p:ext uri="{BB962C8B-B14F-4D97-AF65-F5344CB8AC3E}">
+        <p14:creationId xmlns:p14="http://schemas.microsoft.com/office/powerpoint/2010/main" val="3724482979"/>
+      </p:ext>
+    </p:extLst>
+  </p:cSld>
+  <p:clrMapOvr>
+    <a:masterClrMapping/>
+  </p:clrMapOvr>
+</p:sld>
+</file>
+
+<file path=ppt/slides/slide22.xml><?xml version="1.0" encoding="utf-8"?>
+<p:sld xmlns:a="http://schemas.openxmlformats.org/drawingml/2006/main" xmlns:r="http://schemas.openxmlformats.org/officeDocument/2006/relationships" xmlns:p="http://schemas.openxmlformats.org/presentationml/2006/main">
+  <p:cSld>
+    <p:spTree>
+      <p:nvGrpSpPr>
+        <p:cNvPr id="1" name=""/>
+        <p:cNvGrpSpPr/>
+        <p:nvPr/>
+      </p:nvGrpSpPr>
+      <p:grpSpPr>
+        <a:xfrm>
+          <a:off x="0" y="0"/>
+          <a:ext cx="0" cy="0"/>
+          <a:chOff x="0" y="0"/>
+          <a:chExt cx="0" cy="0"/>
+        </a:xfrm>
+      </p:grpSpPr>
+      <p:sp>
+        <p:nvSpPr>
+          <p:cNvPr id="2" name="Pavadinimas 1">
+            <a:extLst>
+              <a:ext uri="{FF2B5EF4-FFF2-40B4-BE49-F238E27FC236}">
+                <a16:creationId xmlns:a16="http://schemas.microsoft.com/office/drawing/2014/main" id="{184075CD-AF81-0D83-AF05-6D10D6319443}"/>
+              </a:ext>
+            </a:extLst>
+          </p:cNvPr>
+          <p:cNvSpPr>
+            <a:spLocks noGrp="1"/>
+          </p:cNvSpPr>
+          <p:nvPr>
+            <p:ph type="title"/>
+          </p:nvPr>
+        </p:nvSpPr>
+        <p:spPr>
+          <a:xfrm>
+            <a:off x="286839" y="167957"/>
+            <a:ext cx="10515600" cy="1325563"/>
+          </a:xfrm>
+        </p:spPr>
+        <p:txBody>
+          <a:bodyPr/>
+          <a:lstStyle/>
+          <a:p>
+            <a:r>
+              <a:rPr lang="en-US" dirty="0"/>
+              <a:t>Dependency Inversion principle</a:t>
+            </a:r>
+            <a:endParaRPr lang="lt-LT" dirty="0"/>
+          </a:p>
+        </p:txBody>
+      </p:sp>
+      <p:sp>
+        <p:nvSpPr>
+          <p:cNvPr id="3" name="Turinio vietos rezervavimo ženklas 2">
+            <a:extLst>
+              <a:ext uri="{FF2B5EF4-FFF2-40B4-BE49-F238E27FC236}">
+                <a16:creationId xmlns:a16="http://schemas.microsoft.com/office/drawing/2014/main" id="{7550D0C1-729E-A6DF-92AB-3579773EBB29}"/>
+              </a:ext>
+            </a:extLst>
+          </p:cNvPr>
+          <p:cNvSpPr>
+            <a:spLocks noGrp="1"/>
+          </p:cNvSpPr>
+          <p:nvPr>
+            <p:ph idx="1"/>
+          </p:nvPr>
+        </p:nvSpPr>
+        <p:spPr>
+          <a:xfrm>
+            <a:off x="519590" y="2664823"/>
+            <a:ext cx="4822371" cy="3520049"/>
+          </a:xfrm>
+        </p:spPr>
+        <p:txBody>
+          <a:bodyPr/>
+          <a:lstStyle/>
+          <a:p>
+            <a:pPr marL="0" indent="0">
+              <a:buNone/>
+            </a:pPr>
+            <a:r>
+              <a:rPr lang="en-US" u="sng" dirty="0"/>
+              <a:t>Depend on abstractions, not concrete implementations.</a:t>
+            </a:r>
+            <a:endParaRPr lang="lt-LT" u="sng" dirty="0"/>
+          </a:p>
+        </p:txBody>
+      </p:sp>
+      <p:pic>
+        <p:nvPicPr>
+          <p:cNvPr id="5" name="Paveikslėlis 4">
+            <a:extLst>
+              <a:ext uri="{FF2B5EF4-FFF2-40B4-BE49-F238E27FC236}">
+                <a16:creationId xmlns:a16="http://schemas.microsoft.com/office/drawing/2014/main" id="{58A4B17D-A496-E6D6-59C3-E05EB63321EB}"/>
+              </a:ext>
+            </a:extLst>
+          </p:cNvPr>
+          <p:cNvPicPr>
+            <a:picLocks noChangeAspect="1"/>
+          </p:cNvPicPr>
+          <p:nvPr/>
+        </p:nvPicPr>
+        <p:blipFill>
+          <a:blip r:embed="rId2"/>
+          <a:stretch>
+            <a:fillRect/>
+          </a:stretch>
+        </p:blipFill>
+        <p:spPr>
+          <a:xfrm>
+            <a:off x="5544639" y="1687467"/>
+            <a:ext cx="6598580" cy="4118791"/>
+          </a:xfrm>
+          <a:prstGeom prst="rect">
+            <a:avLst/>
+          </a:prstGeom>
+        </p:spPr>
+      </p:pic>
+      <p:sp>
+        <p:nvSpPr>
+          <p:cNvPr id="6" name="TextBox 5">
+            <a:extLst>
+              <a:ext uri="{FF2B5EF4-FFF2-40B4-BE49-F238E27FC236}">
+                <a16:creationId xmlns:a16="http://schemas.microsoft.com/office/drawing/2014/main" id="{CC0444F3-6571-5819-6DF8-B64A37C5D011}"/>
+              </a:ext>
+            </a:extLst>
+          </p:cNvPr>
+          <p:cNvSpPr txBox="1"/>
+          <p:nvPr/>
+        </p:nvSpPr>
+        <p:spPr>
+          <a:xfrm>
+            <a:off x="6783977" y="6000206"/>
+            <a:ext cx="4794711" cy="369332"/>
+          </a:xfrm>
+          <a:prstGeom prst="rect">
+            <a:avLst/>
+          </a:prstGeom>
+          <a:noFill/>
+        </p:spPr>
+        <p:txBody>
+          <a:bodyPr wrap="none" rtlCol="0">
+            <a:spAutoFit/>
+          </a:bodyPr>
+          <a:lstStyle/>
+          <a:p>
+            <a:r>
+              <a:rPr lang="en-US" dirty="0"/>
+              <a:t>Excavator design doesn’t depend on attachments</a:t>
+            </a:r>
+            <a:endParaRPr lang="lt-LT" dirty="0"/>
+          </a:p>
+        </p:txBody>
+      </p:sp>
+    </p:spTree>
+    <p:extLst>
+      <p:ext uri="{BB962C8B-B14F-4D97-AF65-F5344CB8AC3E}">
+        <p14:creationId xmlns:p14="http://schemas.microsoft.com/office/powerpoint/2010/main" val="2656473725"/>
+      </p:ext>
+    </p:extLst>
+  </p:cSld>
+  <p:clrMapOvr>
+    <a:masterClrMapping/>
+  </p:clrMapOvr>
+</p:sld>
+</file>
+
+<file path=ppt/slides/slide23.xml><?xml version="1.0" encoding="utf-8"?>
+<p:sld xmlns:a="http://schemas.openxmlformats.org/drawingml/2006/main" xmlns:r="http://schemas.openxmlformats.org/officeDocument/2006/relationships" xmlns:p="http://schemas.openxmlformats.org/presentationml/2006/main">
+  <p:cSld>
+    <p:spTree>
+      <p:nvGrpSpPr>
+        <p:cNvPr id="1" name=""/>
+        <p:cNvGrpSpPr/>
+        <p:nvPr/>
+      </p:nvGrpSpPr>
+      <p:grpSpPr>
+        <a:xfrm>
+          <a:off x="0" y="0"/>
+          <a:ext cx="0" cy="0"/>
+          <a:chOff x="0" y="0"/>
+          <a:chExt cx="0" cy="0"/>
+        </a:xfrm>
+      </p:grpSpPr>
+      <p:sp>
+        <p:nvSpPr>
+          <p:cNvPr id="2" name="Pavadinimas 1">
+            <a:extLst>
+              <a:ext uri="{FF2B5EF4-FFF2-40B4-BE49-F238E27FC236}">
+                <a16:creationId xmlns:a16="http://schemas.microsoft.com/office/drawing/2014/main" id="{64C9A963-817A-8085-CDC7-E9BA88DD5D02}"/>
+              </a:ext>
+            </a:extLst>
+          </p:cNvPr>
+          <p:cNvSpPr>
+            <a:spLocks noGrp="1"/>
+          </p:cNvSpPr>
+          <p:nvPr>
+            <p:ph type="title"/>
+          </p:nvPr>
+        </p:nvSpPr>
+        <p:spPr/>
+        <p:txBody>
+          <a:bodyPr/>
+          <a:lstStyle/>
+          <a:p>
+            <a:r>
+              <a:rPr lang="en-US" dirty="0"/>
+              <a:t>Tips to make your code SOLID!</a:t>
+            </a:r>
+            <a:endParaRPr lang="lt-LT" dirty="0"/>
+          </a:p>
+        </p:txBody>
+      </p:sp>
+      <p:sp>
+        <p:nvSpPr>
+          <p:cNvPr id="3" name="Turinio vietos rezervavimo ženklas 2">
+            <a:extLst>
+              <a:ext uri="{FF2B5EF4-FFF2-40B4-BE49-F238E27FC236}">
+                <a16:creationId xmlns:a16="http://schemas.microsoft.com/office/drawing/2014/main" id="{908C165C-6DA7-80A5-7364-E23C8DEB729E}"/>
+              </a:ext>
+            </a:extLst>
+          </p:cNvPr>
+          <p:cNvSpPr>
+            <a:spLocks noGrp="1"/>
+          </p:cNvSpPr>
+          <p:nvPr>
+            <p:ph idx="1"/>
+          </p:nvPr>
+        </p:nvSpPr>
+        <p:spPr>
+          <a:xfrm>
+            <a:off x="838200" y="1825625"/>
+            <a:ext cx="10515600" cy="3744665"/>
+          </a:xfrm>
+        </p:spPr>
+        <p:txBody>
+          <a:bodyPr>
+            <a:normAutofit/>
+          </a:bodyPr>
+          <a:lstStyle/>
+          <a:p>
+            <a:r>
+              <a:rPr lang="en-US" dirty="0"/>
+              <a:t>Try to find a balance between grouping and separating code/logic</a:t>
+            </a:r>
+          </a:p>
+          <a:p>
+            <a:r>
+              <a:rPr lang="en-US" dirty="0"/>
+              <a:t>Prefer composition over inheritance</a:t>
+            </a:r>
+          </a:p>
+          <a:p>
+            <a:r>
+              <a:rPr lang="en-US" dirty="0"/>
+              <a:t>Avoid long methods, classes and interfaces</a:t>
+            </a:r>
+          </a:p>
+          <a:p>
+            <a:r>
+              <a:rPr lang="en-US" dirty="0"/>
+              <a:t>Use interfaces! Ensure they have clear reusable purpose</a:t>
+            </a:r>
+          </a:p>
+          <a:p>
+            <a:r>
+              <a:rPr lang="en-US" dirty="0"/>
+              <a:t>Think about what needs to be done to extend the code in the future</a:t>
+            </a:r>
+          </a:p>
+          <a:p>
+            <a:r>
+              <a:rPr lang="en-US" dirty="0"/>
+              <a:t>Assume that someone with less experience is reading your code</a:t>
+            </a:r>
+          </a:p>
+          <a:p>
+            <a:r>
+              <a:rPr lang="en-US" dirty="0"/>
+              <a:t>Avoid hardcoding</a:t>
+            </a:r>
+          </a:p>
+          <a:p>
+            <a:pPr marL="0" indent="0">
+              <a:buNone/>
+            </a:pPr>
+            <a:endParaRPr lang="en-US" dirty="0"/>
+          </a:p>
+          <a:p>
+            <a:endParaRPr lang="en-US" dirty="0"/>
+          </a:p>
+          <a:p>
+            <a:endParaRPr lang="lt-LT" dirty="0"/>
+          </a:p>
+        </p:txBody>
+      </p:sp>
+    </p:spTree>
+    <p:extLst>
+      <p:ext uri="{BB962C8B-B14F-4D97-AF65-F5344CB8AC3E}">
+        <p14:creationId xmlns:p14="http://schemas.microsoft.com/office/powerpoint/2010/main" val="1529863891"/>
+      </p:ext>
+    </p:extLst>
+  </p:cSld>
+  <p:clrMapOvr>
+    <a:masterClrMapping/>
+  </p:clrMapOvr>
+</p:sld>
+</file>
+
+<file path=ppt/slides/slide24.xml><?xml version="1.0" encoding="utf-8"?>
+<p:sld xmlns:a="http://schemas.openxmlformats.org/drawingml/2006/main" xmlns:r="http://schemas.openxmlformats.org/officeDocument/2006/relationships" xmlns:p="http://schemas.openxmlformats.org/presentationml/2006/main">
+  <p:cSld>
+    <p:spTree>
+      <p:nvGrpSpPr>
+        <p:cNvPr id="1" name=""/>
+        <p:cNvGrpSpPr/>
+        <p:nvPr/>
+      </p:nvGrpSpPr>
+      <p:grpSpPr>
+        <a:xfrm>
+          <a:off x="0" y="0"/>
+          <a:ext cx="0" cy="0"/>
+          <a:chOff x="0" y="0"/>
+          <a:chExt cx="0" cy="0"/>
+        </a:xfrm>
+      </p:grpSpPr>
+      <p:sp>
+        <p:nvSpPr>
+          <p:cNvPr id="2" name="Pavadinimas 1">
+            <a:extLst>
+              <a:ext uri="{FF2B5EF4-FFF2-40B4-BE49-F238E27FC236}">
                 <a16:creationId xmlns:a16="http://schemas.microsoft.com/office/drawing/2014/main" id="{184075CD-AF81-0D83-AF05-6D10D6319443}"/>
               </a:ext>
             </a:extLst>
@@ -6150,7 +6734,7 @@
 </p:sld>
 </file>
 
-<file path=ppt/slides/slide22.xml><?xml version="1.0" encoding="utf-8"?>
+<file path=ppt/slides/slide25.xml><?xml version="1.0" encoding="utf-8"?>
 <p:sld xmlns:a="http://schemas.openxmlformats.org/drawingml/2006/main" xmlns:r="http://schemas.openxmlformats.org/officeDocument/2006/relationships" xmlns:p="http://schemas.openxmlformats.org/presentationml/2006/main">
   <p:cSld>
     <p:spTree>

</xml_diff>